<commit_message>
Add v4 main code - vision_ros
</commit_message>
<xml_diff>
--- a/Assets/Presentation1.pptx
+++ b/Assets/Presentation1.pptx
@@ -1,19 +1,114 @@
 
 <file path=ppt/presentation.xml><?xml version="1.0" encoding="utf-8"?>
-<p:presentation xmlns:a="http://schemas.openxmlformats.org/drawingml/2006/main" xmlns:p="http://schemas.openxmlformats.org/presentationml/2006/main" xmlns:r="http://schemas.openxmlformats.org/officeDocument/2006/relationships" xmlns:p14="http://schemas.microsoft.com/office/powerpoint/2010/main" xmlns:p15="http://schemas.microsoft.com/office/powerpoint/2012/main" xmlns:mc="http://schemas.openxmlformats.org/markup-compatibility/2006">
+<p:presentation xmlns:a="http://schemas.openxmlformats.org/drawingml/2006/main" xmlns:r="http://schemas.openxmlformats.org/officeDocument/2006/relationships" xmlns:p="http://schemas.openxmlformats.org/presentationml/2006/main">
   <p:sldMasterIdLst>
-    <p:sldMasterId id="2147483648" r:id="rId2"/>
+    <p:sldMasterId id="2147483648" r:id="rId1"/>
   </p:sldMasterIdLst>
   <p:sldIdLst>
-    <p:sldId id="256" r:id="rId3"/>
+    <p:sldId id="256" r:id="rId2"/>
   </p:sldIdLst>
   <p:sldSz cx="12192000" cy="6858000"/>
   <p:notesSz cx="7559675" cy="10691813"/>
+  <p:defaultTextStyle>
+    <a:defPPr>
+      <a:defRPr lang="en-US"/>
+    </a:defPPr>
+    <a:lvl1pPr marL="0" algn="l" defTabSz="914400" rtl="0" eaLnBrk="1" latinLnBrk="0" hangingPunct="1">
+      <a:defRPr sz="1800" kern="1200">
+        <a:solidFill>
+          <a:schemeClr val="tx1"/>
+        </a:solidFill>
+        <a:latin typeface="+mn-lt"/>
+        <a:ea typeface="+mn-ea"/>
+        <a:cs typeface="+mn-cs"/>
+      </a:defRPr>
+    </a:lvl1pPr>
+    <a:lvl2pPr marL="457200" algn="l" defTabSz="914400" rtl="0" eaLnBrk="1" latinLnBrk="0" hangingPunct="1">
+      <a:defRPr sz="1800" kern="1200">
+        <a:solidFill>
+          <a:schemeClr val="tx1"/>
+        </a:solidFill>
+        <a:latin typeface="+mn-lt"/>
+        <a:ea typeface="+mn-ea"/>
+        <a:cs typeface="+mn-cs"/>
+      </a:defRPr>
+    </a:lvl2pPr>
+    <a:lvl3pPr marL="914400" algn="l" defTabSz="914400" rtl="0" eaLnBrk="1" latinLnBrk="0" hangingPunct="1">
+      <a:defRPr sz="1800" kern="1200">
+        <a:solidFill>
+          <a:schemeClr val="tx1"/>
+        </a:solidFill>
+        <a:latin typeface="+mn-lt"/>
+        <a:ea typeface="+mn-ea"/>
+        <a:cs typeface="+mn-cs"/>
+      </a:defRPr>
+    </a:lvl3pPr>
+    <a:lvl4pPr marL="1371600" algn="l" defTabSz="914400" rtl="0" eaLnBrk="1" latinLnBrk="0" hangingPunct="1">
+      <a:defRPr sz="1800" kern="1200">
+        <a:solidFill>
+          <a:schemeClr val="tx1"/>
+        </a:solidFill>
+        <a:latin typeface="+mn-lt"/>
+        <a:ea typeface="+mn-ea"/>
+        <a:cs typeface="+mn-cs"/>
+      </a:defRPr>
+    </a:lvl4pPr>
+    <a:lvl5pPr marL="1828800" algn="l" defTabSz="914400" rtl="0" eaLnBrk="1" latinLnBrk="0" hangingPunct="1">
+      <a:defRPr sz="1800" kern="1200">
+        <a:solidFill>
+          <a:schemeClr val="tx1"/>
+        </a:solidFill>
+        <a:latin typeface="+mn-lt"/>
+        <a:ea typeface="+mn-ea"/>
+        <a:cs typeface="+mn-cs"/>
+      </a:defRPr>
+    </a:lvl5pPr>
+    <a:lvl6pPr marL="2286000" algn="l" defTabSz="914400" rtl="0" eaLnBrk="1" latinLnBrk="0" hangingPunct="1">
+      <a:defRPr sz="1800" kern="1200">
+        <a:solidFill>
+          <a:schemeClr val="tx1"/>
+        </a:solidFill>
+        <a:latin typeface="+mn-lt"/>
+        <a:ea typeface="+mn-ea"/>
+        <a:cs typeface="+mn-cs"/>
+      </a:defRPr>
+    </a:lvl6pPr>
+    <a:lvl7pPr marL="2743200" algn="l" defTabSz="914400" rtl="0" eaLnBrk="1" latinLnBrk="0" hangingPunct="1">
+      <a:defRPr sz="1800" kern="1200">
+        <a:solidFill>
+          <a:schemeClr val="tx1"/>
+        </a:solidFill>
+        <a:latin typeface="+mn-lt"/>
+        <a:ea typeface="+mn-ea"/>
+        <a:cs typeface="+mn-cs"/>
+      </a:defRPr>
+    </a:lvl7pPr>
+    <a:lvl8pPr marL="3200400" algn="l" defTabSz="914400" rtl="0" eaLnBrk="1" latinLnBrk="0" hangingPunct="1">
+      <a:defRPr sz="1800" kern="1200">
+        <a:solidFill>
+          <a:schemeClr val="tx1"/>
+        </a:solidFill>
+        <a:latin typeface="+mn-lt"/>
+        <a:ea typeface="+mn-ea"/>
+        <a:cs typeface="+mn-cs"/>
+      </a:defRPr>
+    </a:lvl8pPr>
+    <a:lvl9pPr marL="3657600" algn="l" defTabSz="914400" rtl="0" eaLnBrk="1" latinLnBrk="0" hangingPunct="1">
+      <a:defRPr sz="1800" kern="1200">
+        <a:solidFill>
+          <a:schemeClr val="tx1"/>
+        </a:solidFill>
+        <a:latin typeface="+mn-lt"/>
+        <a:ea typeface="+mn-ea"/>
+        <a:cs typeface="+mn-cs"/>
+      </a:defRPr>
+    </a:lvl9pPr>
+  </p:defaultTextStyle>
 </p:presentation>
 </file>
 
 <file path=ppt/slideLayouts/slideLayout1.xml><?xml version="1.0" encoding="utf-8"?>
-<p:sldLayout xmlns:a="http://schemas.openxmlformats.org/drawingml/2006/main" xmlns:p="http://schemas.openxmlformats.org/presentationml/2006/main" xmlns:r="http://schemas.openxmlformats.org/officeDocument/2006/relationships" xmlns:p14="http://schemas.microsoft.com/office/powerpoint/2010/main" xmlns:p15="http://schemas.microsoft.com/office/powerpoint/2012/main" xmlns:mc="http://schemas.openxmlformats.org/markup-compatibility/2006" type="blank" preserve="1">
+<p:sldLayout xmlns:a="http://schemas.openxmlformats.org/drawingml/2006/main" xmlns:r="http://schemas.openxmlformats.org/officeDocument/2006/relationships" xmlns:p="http://schemas.openxmlformats.org/presentationml/2006/main" type="blank" preserve="1">
   <p:cSld name="Blank Slide">
     <p:spTree>
       <p:nvGrpSpPr>
@@ -42,6 +137,7 @@
         <p:spPr/>
         <p:txBody>
           <a:bodyPr/>
+          <a:lstStyle/>
           <a:p>
             <a:r>
               <a:t>Footer</a:t>
@@ -62,10 +158,12 @@
         <p:spPr/>
         <p:txBody>
           <a:bodyPr/>
-          <a:p>
-            <a:fld id="{951606B3-DC8D-434C-8F6D-5E6C3FC75E2E}" type="slidenum">
-              <a:t>&lt;#&gt;</a:t>
+          <a:lstStyle/>
+          <a:p>
+            <a:fld id="{B39E39A1-F614-446A-B74F-4803353B7D9F}" type="slidenum">
+              <a:t>‹#›</a:t>
             </a:fld>
+            <a:endParaRPr/>
           </a:p>
         </p:txBody>
       </p:sp>
@@ -82,21 +180,22 @@
         <p:spPr/>
         <p:txBody>
           <a:bodyPr/>
-          <a:p>
-            <a:r>
-              <a:rPr lang="en-US"/>
-              <a:t/>
-            </a:r>
+          <a:lstStyle/>
+          <a:p>
+            <a:endParaRPr/>
           </a:p>
         </p:txBody>
       </p:sp>
     </p:spTree>
   </p:cSld>
+  <p:clrMapOvr>
+    <a:masterClrMapping/>
+  </p:clrMapOvr>
 </p:sldLayout>
 </file>
 
 <file path=ppt/slideLayouts/slideLayout10.xml><?xml version="1.0" encoding="utf-8"?>
-<p:sldLayout xmlns:a="http://schemas.openxmlformats.org/drawingml/2006/main" xmlns:p="http://schemas.openxmlformats.org/presentationml/2006/main" xmlns:r="http://schemas.openxmlformats.org/officeDocument/2006/relationships" xmlns:p14="http://schemas.microsoft.com/office/powerpoint/2010/main" xmlns:p15="http://schemas.microsoft.com/office/powerpoint/2012/main" xmlns:mc="http://schemas.openxmlformats.org/markup-compatibility/2006" type="objOverTx" preserve="1">
+<p:sldLayout xmlns:a="http://schemas.openxmlformats.org/drawingml/2006/main" xmlns:r="http://schemas.openxmlformats.org/officeDocument/2006/relationships" xmlns:p="http://schemas.openxmlformats.org/presentationml/2006/main" type="objOverTx" preserve="1">
   <p:cSld name="Title, Content over Content">
     <p:spTree>
       <p:nvGrpSpPr>
@@ -114,7 +213,7 @@
       </p:grpSpPr>
       <p:sp>
         <p:nvSpPr>
-          <p:cNvPr id="25" name="PlaceHolder 1"/>
+          <p:cNvPr id="26" name="PlaceHolder 1"/>
           <p:cNvSpPr>
             <a:spLocks noGrp="1"/>
           </p:cNvSpPr>
@@ -125,7 +224,7 @@
         <p:spPr>
           <a:xfrm>
             <a:off x="1523880" y="1122480"/>
-            <a:ext cx="9143280" cy="2386800"/>
+            <a:ext cx="9142920" cy="2386440"/>
           </a:xfrm>
           <a:prstGeom prst="rect">
             <a:avLst/>
@@ -136,14 +235,15 @@
           </a:ln>
         </p:spPr>
         <p:txBody>
-          <a:bodyPr lIns="0" rIns="0" tIns="0" bIns="0" anchor="ctr">
+          <a:bodyPr lIns="0" tIns="0" rIns="0" bIns="0" anchor="ctr">
             <a:noAutofit/>
           </a:bodyPr>
+          <a:lstStyle/>
           <a:p>
             <a:pPr algn="ctr">
               <a:buNone/>
             </a:pPr>
-            <a:endParaRPr b="0" lang="en-US" sz="4400" spc="-1" strike="noStrike">
+            <a:endParaRPr lang="en-US" sz="4400" b="0" strike="noStrike" spc="-1">
               <a:latin typeface="Arial"/>
             </a:endParaRPr>
           </a:p>
@@ -151,7 +251,7 @@
       </p:sp>
       <p:sp>
         <p:nvSpPr>
-          <p:cNvPr id="26" name="PlaceHolder 2"/>
+          <p:cNvPr id="27" name="PlaceHolder 2"/>
           <p:cNvSpPr>
             <a:spLocks noGrp="1"/>
           </p:cNvSpPr>
@@ -162,7 +262,7 @@
         <p:spPr>
           <a:xfrm>
             <a:off x="609480" y="1604520"/>
-            <a:ext cx="10972440" cy="1896840"/>
+            <a:ext cx="10972080" cy="1896840"/>
           </a:xfrm>
           <a:prstGeom prst="rect">
             <a:avLst/>
@@ -173,11 +273,12 @@
           </a:ln>
         </p:spPr>
         <p:txBody>
-          <a:bodyPr lIns="0" rIns="0" tIns="0" bIns="0" anchor="t">
+          <a:bodyPr lIns="0" tIns="0" rIns="0" bIns="0" anchor="t">
             <a:normAutofit/>
           </a:bodyPr>
-          <a:p>
-            <a:endParaRPr b="0" lang="en-US" sz="3200" spc="-1" strike="noStrike">
+          <a:lstStyle/>
+          <a:p>
+            <a:endParaRPr lang="en-US" sz="3200" b="0" strike="noStrike" spc="-1">
               <a:latin typeface="Arial"/>
             </a:endParaRPr>
           </a:p>
@@ -185,7 +286,7 @@
       </p:sp>
       <p:sp>
         <p:nvSpPr>
-          <p:cNvPr id="27" name="PlaceHolder 3"/>
+          <p:cNvPr id="28" name="PlaceHolder 3"/>
           <p:cNvSpPr>
             <a:spLocks noGrp="1"/>
           </p:cNvSpPr>
@@ -196,7 +297,7 @@
         <p:spPr>
           <a:xfrm>
             <a:off x="609480" y="3682080"/>
-            <a:ext cx="10972440" cy="1896840"/>
+            <a:ext cx="10972080" cy="1896840"/>
           </a:xfrm>
           <a:prstGeom prst="rect">
             <a:avLst/>
@@ -207,11 +308,12 @@
           </a:ln>
         </p:spPr>
         <p:txBody>
-          <a:bodyPr lIns="0" rIns="0" tIns="0" bIns="0" anchor="t">
+          <a:bodyPr lIns="0" tIns="0" rIns="0" bIns="0" anchor="t">
             <a:normAutofit/>
           </a:bodyPr>
-          <a:p>
-            <a:endParaRPr b="0" lang="en-US" sz="3200" spc="-1" strike="noStrike">
+          <a:lstStyle/>
+          <a:p>
+            <a:endParaRPr lang="en-US" sz="3200" b="0" strike="noStrike" spc="-1">
               <a:latin typeface="Arial"/>
             </a:endParaRPr>
           </a:p>
@@ -230,6 +332,7 @@
         <p:spPr/>
         <p:txBody>
           <a:bodyPr/>
+          <a:lstStyle/>
           <a:p>
             <a:r>
               <a:t>Footer</a:t>
@@ -250,10 +353,12 @@
         <p:spPr/>
         <p:txBody>
           <a:bodyPr/>
-          <a:p>
-            <a:fld id="{B4228408-6A9E-4832-BAC9-CCB91B5D9798}" type="slidenum">
-              <a:t>&lt;#&gt;</a:t>
+          <a:lstStyle/>
+          <a:p>
+            <a:fld id="{E30D0581-8227-4A17-B660-5FF94FD652EE}" type="slidenum">
+              <a:t>‹#›</a:t>
             </a:fld>
+            <a:endParaRPr/>
           </a:p>
         </p:txBody>
       </p:sp>
@@ -270,21 +375,22 @@
         <p:spPr/>
         <p:txBody>
           <a:bodyPr/>
-          <a:p>
-            <a:r>
-              <a:rPr lang="en-US"/>
-              <a:t/>
-            </a:r>
+          <a:lstStyle/>
+          <a:p>
+            <a:endParaRPr/>
           </a:p>
         </p:txBody>
       </p:sp>
     </p:spTree>
   </p:cSld>
+  <p:clrMapOvr>
+    <a:masterClrMapping/>
+  </p:clrMapOvr>
 </p:sldLayout>
 </file>
 
 <file path=ppt/slideLayouts/slideLayout11.xml><?xml version="1.0" encoding="utf-8"?>
-<p:sldLayout xmlns:a="http://schemas.openxmlformats.org/drawingml/2006/main" xmlns:p="http://schemas.openxmlformats.org/presentationml/2006/main" xmlns:r="http://schemas.openxmlformats.org/officeDocument/2006/relationships" xmlns:p14="http://schemas.microsoft.com/office/powerpoint/2010/main" xmlns:p15="http://schemas.microsoft.com/office/powerpoint/2012/main" xmlns:mc="http://schemas.openxmlformats.org/markup-compatibility/2006" type="fourObj" preserve="1">
+<p:sldLayout xmlns:a="http://schemas.openxmlformats.org/drawingml/2006/main" xmlns:r="http://schemas.openxmlformats.org/officeDocument/2006/relationships" xmlns:p="http://schemas.openxmlformats.org/presentationml/2006/main" type="fourObj" preserve="1">
   <p:cSld name="Title, 4 Content">
     <p:spTree>
       <p:nvGrpSpPr>
@@ -302,7 +408,7 @@
       </p:grpSpPr>
       <p:sp>
         <p:nvSpPr>
-          <p:cNvPr id="28" name="PlaceHolder 1"/>
+          <p:cNvPr id="29" name="PlaceHolder 1"/>
           <p:cNvSpPr>
             <a:spLocks noGrp="1"/>
           </p:cNvSpPr>
@@ -313,7 +419,7 @@
         <p:spPr>
           <a:xfrm>
             <a:off x="1523880" y="1122480"/>
-            <a:ext cx="9143280" cy="2386800"/>
+            <a:ext cx="9142920" cy="2386440"/>
           </a:xfrm>
           <a:prstGeom prst="rect">
             <a:avLst/>
@@ -324,14 +430,15 @@
           </a:ln>
         </p:spPr>
         <p:txBody>
-          <a:bodyPr lIns="0" rIns="0" tIns="0" bIns="0" anchor="ctr">
+          <a:bodyPr lIns="0" tIns="0" rIns="0" bIns="0" anchor="ctr">
             <a:noAutofit/>
           </a:bodyPr>
+          <a:lstStyle/>
           <a:p>
             <a:pPr algn="ctr">
               <a:buNone/>
             </a:pPr>
-            <a:endParaRPr b="0" lang="en-US" sz="4400" spc="-1" strike="noStrike">
+            <a:endParaRPr lang="en-US" sz="4400" b="0" strike="noStrike" spc="-1">
               <a:latin typeface="Arial"/>
             </a:endParaRPr>
           </a:p>
@@ -339,7 +446,7 @@
       </p:sp>
       <p:sp>
         <p:nvSpPr>
-          <p:cNvPr id="29" name="PlaceHolder 2"/>
+          <p:cNvPr id="30" name="PlaceHolder 2"/>
           <p:cNvSpPr>
             <a:spLocks noGrp="1"/>
           </p:cNvSpPr>
@@ -361,11 +468,12 @@
           </a:ln>
         </p:spPr>
         <p:txBody>
-          <a:bodyPr lIns="0" rIns="0" tIns="0" bIns="0" anchor="t">
+          <a:bodyPr lIns="0" tIns="0" rIns="0" bIns="0" anchor="t">
             <a:normAutofit/>
           </a:bodyPr>
-          <a:p>
-            <a:endParaRPr b="0" lang="en-US" sz="3200" spc="-1" strike="noStrike">
+          <a:lstStyle/>
+          <a:p>
+            <a:endParaRPr lang="en-US" sz="3200" b="0" strike="noStrike" spc="-1">
               <a:latin typeface="Arial"/>
             </a:endParaRPr>
           </a:p>
@@ -373,7 +481,7 @@
       </p:sp>
       <p:sp>
         <p:nvSpPr>
-          <p:cNvPr id="30" name="PlaceHolder 3"/>
+          <p:cNvPr id="31" name="PlaceHolder 3"/>
           <p:cNvSpPr>
             <a:spLocks noGrp="1"/>
           </p:cNvSpPr>
@@ -395,11 +503,12 @@
           </a:ln>
         </p:spPr>
         <p:txBody>
-          <a:bodyPr lIns="0" rIns="0" tIns="0" bIns="0" anchor="t">
+          <a:bodyPr lIns="0" tIns="0" rIns="0" bIns="0" anchor="t">
             <a:normAutofit/>
           </a:bodyPr>
-          <a:p>
-            <a:endParaRPr b="0" lang="en-US" sz="3200" spc="-1" strike="noStrike">
+          <a:lstStyle/>
+          <a:p>
+            <a:endParaRPr lang="en-US" sz="3200" b="0" strike="noStrike" spc="-1">
               <a:latin typeface="Arial"/>
             </a:endParaRPr>
           </a:p>
@@ -407,7 +516,7 @@
       </p:sp>
       <p:sp>
         <p:nvSpPr>
-          <p:cNvPr id="31" name="PlaceHolder 4"/>
+          <p:cNvPr id="32" name="PlaceHolder 4"/>
           <p:cNvSpPr>
             <a:spLocks noGrp="1"/>
           </p:cNvSpPr>
@@ -429,11 +538,12 @@
           </a:ln>
         </p:spPr>
         <p:txBody>
-          <a:bodyPr lIns="0" rIns="0" tIns="0" bIns="0" anchor="t">
+          <a:bodyPr lIns="0" tIns="0" rIns="0" bIns="0" anchor="t">
             <a:normAutofit/>
           </a:bodyPr>
-          <a:p>
-            <a:endParaRPr b="0" lang="en-US" sz="3200" spc="-1" strike="noStrike">
+          <a:lstStyle/>
+          <a:p>
+            <a:endParaRPr lang="en-US" sz="3200" b="0" strike="noStrike" spc="-1">
               <a:latin typeface="Arial"/>
             </a:endParaRPr>
           </a:p>
@@ -441,7 +551,7 @@
       </p:sp>
       <p:sp>
         <p:nvSpPr>
-          <p:cNvPr id="32" name="PlaceHolder 5"/>
+          <p:cNvPr id="33" name="PlaceHolder 5"/>
           <p:cNvSpPr>
             <a:spLocks noGrp="1"/>
           </p:cNvSpPr>
@@ -463,11 +573,12 @@
           </a:ln>
         </p:spPr>
         <p:txBody>
-          <a:bodyPr lIns="0" rIns="0" tIns="0" bIns="0" anchor="t">
+          <a:bodyPr lIns="0" tIns="0" rIns="0" bIns="0" anchor="t">
             <a:normAutofit/>
           </a:bodyPr>
-          <a:p>
-            <a:endParaRPr b="0" lang="en-US" sz="3200" spc="-1" strike="noStrike">
+          <a:lstStyle/>
+          <a:p>
+            <a:endParaRPr lang="en-US" sz="3200" b="0" strike="noStrike" spc="-1">
               <a:latin typeface="Arial"/>
             </a:endParaRPr>
           </a:p>
@@ -486,6 +597,7 @@
         <p:spPr/>
         <p:txBody>
           <a:bodyPr/>
+          <a:lstStyle/>
           <a:p>
             <a:r>
               <a:t>Footer</a:t>
@@ -506,10 +618,12 @@
         <p:spPr/>
         <p:txBody>
           <a:bodyPr/>
-          <a:p>
-            <a:fld id="{CB6B2687-0FB1-4DC1-99BC-63B92D306FF8}" type="slidenum">
-              <a:t>&lt;#&gt;</a:t>
+          <a:lstStyle/>
+          <a:p>
+            <a:fld id="{629107A2-BA0D-422A-9680-01A514E76561}" type="slidenum">
+              <a:t>‹#›</a:t>
             </a:fld>
+            <a:endParaRPr/>
           </a:p>
         </p:txBody>
       </p:sp>
@@ -526,21 +640,22 @@
         <p:spPr/>
         <p:txBody>
           <a:bodyPr/>
-          <a:p>
-            <a:r>
-              <a:rPr lang="en-US"/>
-              <a:t/>
-            </a:r>
+          <a:lstStyle/>
+          <a:p>
+            <a:endParaRPr/>
           </a:p>
         </p:txBody>
       </p:sp>
     </p:spTree>
   </p:cSld>
+  <p:clrMapOvr>
+    <a:masterClrMapping/>
+  </p:clrMapOvr>
 </p:sldLayout>
 </file>
 
 <file path=ppt/slideLayouts/slideLayout12.xml><?xml version="1.0" encoding="utf-8"?>
-<p:sldLayout xmlns:a="http://schemas.openxmlformats.org/drawingml/2006/main" xmlns:p="http://schemas.openxmlformats.org/presentationml/2006/main" xmlns:r="http://schemas.openxmlformats.org/officeDocument/2006/relationships" xmlns:p14="http://schemas.microsoft.com/office/powerpoint/2010/main" xmlns:p15="http://schemas.microsoft.com/office/powerpoint/2012/main" xmlns:mc="http://schemas.openxmlformats.org/markup-compatibility/2006" type="blank" preserve="1">
+<p:sldLayout xmlns:a="http://schemas.openxmlformats.org/drawingml/2006/main" xmlns:r="http://schemas.openxmlformats.org/officeDocument/2006/relationships" xmlns:p="http://schemas.openxmlformats.org/presentationml/2006/main" type="blank" preserve="1">
   <p:cSld name="Title, 6 Content">
     <p:spTree>
       <p:nvGrpSpPr>
@@ -558,7 +673,7 @@
       </p:grpSpPr>
       <p:sp>
         <p:nvSpPr>
-          <p:cNvPr id="33" name="PlaceHolder 1"/>
+          <p:cNvPr id="34" name="PlaceHolder 1"/>
           <p:cNvSpPr>
             <a:spLocks noGrp="1"/>
           </p:cNvSpPr>
@@ -569,7 +684,7 @@
         <p:spPr>
           <a:xfrm>
             <a:off x="1523880" y="1122480"/>
-            <a:ext cx="9143280" cy="2386800"/>
+            <a:ext cx="9142920" cy="2386440"/>
           </a:xfrm>
           <a:prstGeom prst="rect">
             <a:avLst/>
@@ -580,14 +695,15 @@
           </a:ln>
         </p:spPr>
         <p:txBody>
-          <a:bodyPr lIns="0" rIns="0" tIns="0" bIns="0" anchor="ctr">
+          <a:bodyPr lIns="0" tIns="0" rIns="0" bIns="0" anchor="ctr">
             <a:noAutofit/>
           </a:bodyPr>
+          <a:lstStyle/>
           <a:p>
             <a:pPr algn="ctr">
               <a:buNone/>
             </a:pPr>
-            <a:endParaRPr b="0" lang="en-US" sz="4400" spc="-1" strike="noStrike">
+            <a:endParaRPr lang="en-US" sz="4400" b="0" strike="noStrike" spc="-1">
               <a:latin typeface="Arial"/>
             </a:endParaRPr>
           </a:p>
@@ -595,7 +711,7 @@
       </p:sp>
       <p:sp>
         <p:nvSpPr>
-          <p:cNvPr id="34" name="PlaceHolder 2"/>
+          <p:cNvPr id="35" name="PlaceHolder 2"/>
           <p:cNvSpPr>
             <a:spLocks noGrp="1"/>
           </p:cNvSpPr>
@@ -606,7 +722,7 @@
         <p:spPr>
           <a:xfrm>
             <a:off x="609480" y="1604520"/>
-            <a:ext cx="3533040" cy="1896840"/>
+            <a:ext cx="3532680" cy="1896840"/>
           </a:xfrm>
           <a:prstGeom prst="rect">
             <a:avLst/>
@@ -617,11 +733,12 @@
           </a:ln>
         </p:spPr>
         <p:txBody>
-          <a:bodyPr lIns="0" rIns="0" tIns="0" bIns="0" anchor="t">
+          <a:bodyPr lIns="0" tIns="0" rIns="0" bIns="0" anchor="t">
             <a:normAutofit/>
           </a:bodyPr>
-          <a:p>
-            <a:endParaRPr b="0" lang="en-US" sz="3200" spc="-1" strike="noStrike">
+          <a:lstStyle/>
+          <a:p>
+            <a:endParaRPr lang="en-US" sz="3200" b="0" strike="noStrike" spc="-1">
               <a:latin typeface="Arial"/>
             </a:endParaRPr>
           </a:p>
@@ -629,7 +746,7 @@
       </p:sp>
       <p:sp>
         <p:nvSpPr>
-          <p:cNvPr id="35" name="PlaceHolder 3"/>
+          <p:cNvPr id="36" name="PlaceHolder 3"/>
           <p:cNvSpPr>
             <a:spLocks noGrp="1"/>
           </p:cNvSpPr>
@@ -639,8 +756,8 @@
         </p:nvSpPr>
         <p:spPr>
           <a:xfrm>
-            <a:off x="4319640" y="1604520"/>
-            <a:ext cx="3533040" cy="1896840"/>
+            <a:off x="4319280" y="1604520"/>
+            <a:ext cx="3532680" cy="1896840"/>
           </a:xfrm>
           <a:prstGeom prst="rect">
             <a:avLst/>
@@ -651,11 +768,12 @@
           </a:ln>
         </p:spPr>
         <p:txBody>
-          <a:bodyPr lIns="0" rIns="0" tIns="0" bIns="0" anchor="t">
+          <a:bodyPr lIns="0" tIns="0" rIns="0" bIns="0" anchor="t">
             <a:normAutofit/>
           </a:bodyPr>
-          <a:p>
-            <a:endParaRPr b="0" lang="en-US" sz="3200" spc="-1" strike="noStrike">
+          <a:lstStyle/>
+          <a:p>
+            <a:endParaRPr lang="en-US" sz="3200" b="0" strike="noStrike" spc="-1">
               <a:latin typeface="Arial"/>
             </a:endParaRPr>
           </a:p>
@@ -663,7 +781,7 @@
       </p:sp>
       <p:sp>
         <p:nvSpPr>
-          <p:cNvPr id="36" name="PlaceHolder 4"/>
+          <p:cNvPr id="37" name="PlaceHolder 4"/>
           <p:cNvSpPr>
             <a:spLocks noGrp="1"/>
           </p:cNvSpPr>
@@ -673,8 +791,8 @@
         </p:nvSpPr>
         <p:spPr>
           <a:xfrm>
-            <a:off x="8029800" y="1604520"/>
-            <a:ext cx="3533040" cy="1896840"/>
+            <a:off x="8028720" y="1604520"/>
+            <a:ext cx="3532680" cy="1896840"/>
           </a:xfrm>
           <a:prstGeom prst="rect">
             <a:avLst/>
@@ -685,11 +803,12 @@
           </a:ln>
         </p:spPr>
         <p:txBody>
-          <a:bodyPr lIns="0" rIns="0" tIns="0" bIns="0" anchor="t">
+          <a:bodyPr lIns="0" tIns="0" rIns="0" bIns="0" anchor="t">
             <a:normAutofit/>
           </a:bodyPr>
-          <a:p>
-            <a:endParaRPr b="0" lang="en-US" sz="3200" spc="-1" strike="noStrike">
+          <a:lstStyle/>
+          <a:p>
+            <a:endParaRPr lang="en-US" sz="3200" b="0" strike="noStrike" spc="-1">
               <a:latin typeface="Arial"/>
             </a:endParaRPr>
           </a:p>
@@ -697,7 +816,7 @@
       </p:sp>
       <p:sp>
         <p:nvSpPr>
-          <p:cNvPr id="37" name="PlaceHolder 5"/>
+          <p:cNvPr id="38" name="PlaceHolder 5"/>
           <p:cNvSpPr>
             <a:spLocks noGrp="1"/>
           </p:cNvSpPr>
@@ -708,7 +827,7 @@
         <p:spPr>
           <a:xfrm>
             <a:off x="609480" y="3682080"/>
-            <a:ext cx="3533040" cy="1896840"/>
+            <a:ext cx="3532680" cy="1896840"/>
           </a:xfrm>
           <a:prstGeom prst="rect">
             <a:avLst/>
@@ -719,11 +838,12 @@
           </a:ln>
         </p:spPr>
         <p:txBody>
-          <a:bodyPr lIns="0" rIns="0" tIns="0" bIns="0" anchor="t">
+          <a:bodyPr lIns="0" tIns="0" rIns="0" bIns="0" anchor="t">
             <a:normAutofit/>
           </a:bodyPr>
-          <a:p>
-            <a:endParaRPr b="0" lang="en-US" sz="3200" spc="-1" strike="noStrike">
+          <a:lstStyle/>
+          <a:p>
+            <a:endParaRPr lang="en-US" sz="3200" b="0" strike="noStrike" spc="-1">
               <a:latin typeface="Arial"/>
             </a:endParaRPr>
           </a:p>
@@ -731,7 +851,7 @@
       </p:sp>
       <p:sp>
         <p:nvSpPr>
-          <p:cNvPr id="38" name="PlaceHolder 6"/>
+          <p:cNvPr id="39" name="PlaceHolder 6"/>
           <p:cNvSpPr>
             <a:spLocks noGrp="1"/>
           </p:cNvSpPr>
@@ -741,8 +861,8 @@
         </p:nvSpPr>
         <p:spPr>
           <a:xfrm>
-            <a:off x="4319640" y="3682080"/>
-            <a:ext cx="3533040" cy="1896840"/>
+            <a:off x="4319280" y="3682080"/>
+            <a:ext cx="3532680" cy="1896840"/>
           </a:xfrm>
           <a:prstGeom prst="rect">
             <a:avLst/>
@@ -753,11 +873,12 @@
           </a:ln>
         </p:spPr>
         <p:txBody>
-          <a:bodyPr lIns="0" rIns="0" tIns="0" bIns="0" anchor="t">
+          <a:bodyPr lIns="0" tIns="0" rIns="0" bIns="0" anchor="t">
             <a:normAutofit/>
           </a:bodyPr>
-          <a:p>
-            <a:endParaRPr b="0" lang="en-US" sz="3200" spc="-1" strike="noStrike">
+          <a:lstStyle/>
+          <a:p>
+            <a:endParaRPr lang="en-US" sz="3200" b="0" strike="noStrike" spc="-1">
               <a:latin typeface="Arial"/>
             </a:endParaRPr>
           </a:p>
@@ -765,7 +886,7 @@
       </p:sp>
       <p:sp>
         <p:nvSpPr>
-          <p:cNvPr id="39" name="PlaceHolder 7"/>
+          <p:cNvPr id="40" name="PlaceHolder 7"/>
           <p:cNvSpPr>
             <a:spLocks noGrp="1"/>
           </p:cNvSpPr>
@@ -775,8 +896,8 @@
         </p:nvSpPr>
         <p:spPr>
           <a:xfrm>
-            <a:off x="8029800" y="3682080"/>
-            <a:ext cx="3533040" cy="1896840"/>
+            <a:off x="8028720" y="3682080"/>
+            <a:ext cx="3532680" cy="1896840"/>
           </a:xfrm>
           <a:prstGeom prst="rect">
             <a:avLst/>
@@ -787,11 +908,12 @@
           </a:ln>
         </p:spPr>
         <p:txBody>
-          <a:bodyPr lIns="0" rIns="0" tIns="0" bIns="0" anchor="t">
+          <a:bodyPr lIns="0" tIns="0" rIns="0" bIns="0" anchor="t">
             <a:normAutofit/>
           </a:bodyPr>
-          <a:p>
-            <a:endParaRPr b="0" lang="en-US" sz="3200" spc="-1" strike="noStrike">
+          <a:lstStyle/>
+          <a:p>
+            <a:endParaRPr lang="en-US" sz="3200" b="0" strike="noStrike" spc="-1">
               <a:latin typeface="Arial"/>
             </a:endParaRPr>
           </a:p>
@@ -810,6 +932,7 @@
         <p:spPr/>
         <p:txBody>
           <a:bodyPr/>
+          <a:lstStyle/>
           <a:p>
             <a:r>
               <a:t>Footer</a:t>
@@ -830,10 +953,12 @@
         <p:spPr/>
         <p:txBody>
           <a:bodyPr/>
-          <a:p>
-            <a:fld id="{EB1717F1-AC7B-492E-AD99-976693E5BE7A}" type="slidenum">
-              <a:t>&lt;#&gt;</a:t>
+          <a:lstStyle/>
+          <a:p>
+            <a:fld id="{71AE8F72-EA8E-4C72-9010-1A6C414F8747}" type="slidenum">
+              <a:t>‹#›</a:t>
             </a:fld>
+            <a:endParaRPr/>
           </a:p>
         </p:txBody>
       </p:sp>
@@ -850,21 +975,22 @@
         <p:spPr/>
         <p:txBody>
           <a:bodyPr/>
-          <a:p>
-            <a:r>
-              <a:rPr lang="en-US"/>
-              <a:t/>
-            </a:r>
+          <a:lstStyle/>
+          <a:p>
+            <a:endParaRPr/>
           </a:p>
         </p:txBody>
       </p:sp>
     </p:spTree>
   </p:cSld>
+  <p:clrMapOvr>
+    <a:masterClrMapping/>
+  </p:clrMapOvr>
 </p:sldLayout>
 </file>
 
 <file path=ppt/slideLayouts/slideLayout2.xml><?xml version="1.0" encoding="utf-8"?>
-<p:sldLayout xmlns:a="http://schemas.openxmlformats.org/drawingml/2006/main" xmlns:p="http://schemas.openxmlformats.org/presentationml/2006/main" xmlns:r="http://schemas.openxmlformats.org/officeDocument/2006/relationships" xmlns:p14="http://schemas.microsoft.com/office/powerpoint/2010/main" xmlns:p15="http://schemas.microsoft.com/office/powerpoint/2012/main" xmlns:mc="http://schemas.openxmlformats.org/markup-compatibility/2006" type="tx" preserve="1">
+<p:sldLayout xmlns:a="http://schemas.openxmlformats.org/drawingml/2006/main" xmlns:r="http://schemas.openxmlformats.org/officeDocument/2006/relationships" xmlns:p="http://schemas.openxmlformats.org/presentationml/2006/main" type="tx" preserve="1">
   <p:cSld name="Title Slide">
     <p:spTree>
       <p:nvGrpSpPr>
@@ -882,7 +1008,7 @@
       </p:grpSpPr>
       <p:sp>
         <p:nvSpPr>
-          <p:cNvPr id="4" name="PlaceHolder 1"/>
+          <p:cNvPr id="5" name="PlaceHolder 1"/>
           <p:cNvSpPr>
             <a:spLocks noGrp="1"/>
           </p:cNvSpPr>
@@ -893,7 +1019,7 @@
         <p:spPr>
           <a:xfrm>
             <a:off x="1523880" y="1122480"/>
-            <a:ext cx="9143280" cy="2386800"/>
+            <a:ext cx="9142920" cy="2386440"/>
           </a:xfrm>
           <a:prstGeom prst="rect">
             <a:avLst/>
@@ -904,14 +1030,15 @@
           </a:ln>
         </p:spPr>
         <p:txBody>
-          <a:bodyPr lIns="0" rIns="0" tIns="0" bIns="0" anchor="ctr">
+          <a:bodyPr lIns="0" tIns="0" rIns="0" bIns="0" anchor="ctr">
             <a:noAutofit/>
           </a:bodyPr>
+          <a:lstStyle/>
           <a:p>
             <a:pPr algn="ctr">
               <a:buNone/>
             </a:pPr>
-            <a:endParaRPr b="0" lang="en-US" sz="4400" spc="-1" strike="noStrike">
+            <a:endParaRPr lang="en-US" sz="4400" b="0" strike="noStrike" spc="-1">
               <a:latin typeface="Arial"/>
             </a:endParaRPr>
           </a:p>
@@ -919,7 +1046,7 @@
       </p:sp>
       <p:sp>
         <p:nvSpPr>
-          <p:cNvPr id="5" name="PlaceHolder 2"/>
+          <p:cNvPr id="6" name="PlaceHolder 2"/>
           <p:cNvSpPr>
             <a:spLocks noGrp="1"/>
           </p:cNvSpPr>
@@ -930,7 +1057,7 @@
         <p:spPr>
           <a:xfrm>
             <a:off x="609480" y="1604520"/>
-            <a:ext cx="10972440" cy="3977280"/>
+            <a:ext cx="10972080" cy="3976920"/>
           </a:xfrm>
           <a:prstGeom prst="rect">
             <a:avLst/>
@@ -941,14 +1068,15 @@
           </a:ln>
         </p:spPr>
         <p:txBody>
-          <a:bodyPr lIns="0" rIns="0" tIns="0" bIns="0" anchor="ctr">
+          <a:bodyPr lIns="0" tIns="0" rIns="0" bIns="0" anchor="ctr">
             <a:noAutofit/>
           </a:bodyPr>
+          <a:lstStyle/>
           <a:p>
             <a:pPr algn="ctr">
               <a:buNone/>
             </a:pPr>
-            <a:endParaRPr b="0" lang="en-US" sz="3200" spc="-1" strike="noStrike">
+            <a:endParaRPr lang="en-US" sz="3200" b="0" strike="noStrike" spc="-1">
               <a:latin typeface="Arial"/>
             </a:endParaRPr>
           </a:p>
@@ -967,6 +1095,7 @@
         <p:spPr/>
         <p:txBody>
           <a:bodyPr/>
+          <a:lstStyle/>
           <a:p>
             <a:r>
               <a:t>Footer</a:t>
@@ -976,7 +1105,7 @@
       </p:sp>
       <p:sp>
         <p:nvSpPr>
-          <p:cNvPr id="5" name="PlaceHolder 4"/>
+          <p:cNvPr id="2" name="PlaceHolder 4"/>
           <p:cNvSpPr>
             <a:spLocks noGrp="1"/>
           </p:cNvSpPr>
@@ -987,16 +1116,18 @@
         <p:spPr/>
         <p:txBody>
           <a:bodyPr/>
-          <a:p>
-            <a:fld id="{36F20B14-2E59-464C-8D21-1DCAD41E0364}" type="slidenum">
-              <a:t>&lt;#&gt;</a:t>
+          <a:lstStyle/>
+          <a:p>
+            <a:fld id="{05226BF6-6CE3-437F-8CC1-60C751C37531}" type="slidenum">
+              <a:t>‹#›</a:t>
             </a:fld>
-          </a:p>
-        </p:txBody>
-      </p:sp>
-      <p:sp>
-        <p:nvSpPr>
-          <p:cNvPr id="6" name="PlaceHolder 5"/>
+            <a:endParaRPr/>
+          </a:p>
+        </p:txBody>
+      </p:sp>
+      <p:sp>
+        <p:nvSpPr>
+          <p:cNvPr id="3" name="PlaceHolder 5"/>
           <p:cNvSpPr>
             <a:spLocks noGrp="1"/>
           </p:cNvSpPr>
@@ -1007,21 +1138,22 @@
         <p:spPr/>
         <p:txBody>
           <a:bodyPr/>
-          <a:p>
-            <a:r>
-              <a:rPr lang="en-US"/>
-              <a:t/>
-            </a:r>
+          <a:lstStyle/>
+          <a:p>
+            <a:endParaRPr/>
           </a:p>
         </p:txBody>
       </p:sp>
     </p:spTree>
   </p:cSld>
+  <p:clrMapOvr>
+    <a:masterClrMapping/>
+  </p:clrMapOvr>
 </p:sldLayout>
 </file>
 
 <file path=ppt/slideLayouts/slideLayout3.xml><?xml version="1.0" encoding="utf-8"?>
-<p:sldLayout xmlns:a="http://schemas.openxmlformats.org/drawingml/2006/main" xmlns:p="http://schemas.openxmlformats.org/presentationml/2006/main" xmlns:r="http://schemas.openxmlformats.org/officeDocument/2006/relationships" xmlns:p14="http://schemas.microsoft.com/office/powerpoint/2010/main" xmlns:p15="http://schemas.microsoft.com/office/powerpoint/2012/main" xmlns:mc="http://schemas.openxmlformats.org/markup-compatibility/2006" type="obj" preserve="1">
+<p:sldLayout xmlns:a="http://schemas.openxmlformats.org/drawingml/2006/main" xmlns:r="http://schemas.openxmlformats.org/officeDocument/2006/relationships" xmlns:p="http://schemas.openxmlformats.org/presentationml/2006/main" type="obj" preserve="1">
   <p:cSld name="Title, Content">
     <p:spTree>
       <p:nvGrpSpPr>
@@ -1039,7 +1171,7 @@
       </p:grpSpPr>
       <p:sp>
         <p:nvSpPr>
-          <p:cNvPr id="6" name="PlaceHolder 1"/>
+          <p:cNvPr id="7" name="PlaceHolder 1"/>
           <p:cNvSpPr>
             <a:spLocks noGrp="1"/>
           </p:cNvSpPr>
@@ -1050,7 +1182,7 @@
         <p:spPr>
           <a:xfrm>
             <a:off x="1523880" y="1122480"/>
-            <a:ext cx="9143280" cy="2386800"/>
+            <a:ext cx="9142920" cy="2386440"/>
           </a:xfrm>
           <a:prstGeom prst="rect">
             <a:avLst/>
@@ -1061,14 +1193,15 @@
           </a:ln>
         </p:spPr>
         <p:txBody>
-          <a:bodyPr lIns="0" rIns="0" tIns="0" bIns="0" anchor="ctr">
+          <a:bodyPr lIns="0" tIns="0" rIns="0" bIns="0" anchor="ctr">
             <a:noAutofit/>
           </a:bodyPr>
+          <a:lstStyle/>
           <a:p>
             <a:pPr algn="ctr">
               <a:buNone/>
             </a:pPr>
-            <a:endParaRPr b="0" lang="en-US" sz="4400" spc="-1" strike="noStrike">
+            <a:endParaRPr lang="en-US" sz="4400" b="0" strike="noStrike" spc="-1">
               <a:latin typeface="Arial"/>
             </a:endParaRPr>
           </a:p>
@@ -1076,7 +1209,7 @@
       </p:sp>
       <p:sp>
         <p:nvSpPr>
-          <p:cNvPr id="7" name="PlaceHolder 2"/>
+          <p:cNvPr id="8" name="PlaceHolder 2"/>
           <p:cNvSpPr>
             <a:spLocks noGrp="1"/>
           </p:cNvSpPr>
@@ -1087,7 +1220,7 @@
         <p:spPr>
           <a:xfrm>
             <a:off x="609480" y="1604520"/>
-            <a:ext cx="10972440" cy="3977280"/>
+            <a:ext cx="10972080" cy="3976920"/>
           </a:xfrm>
           <a:prstGeom prst="rect">
             <a:avLst/>
@@ -1098,11 +1231,12 @@
           </a:ln>
         </p:spPr>
         <p:txBody>
-          <a:bodyPr lIns="0" rIns="0" tIns="0" bIns="0" anchor="t">
+          <a:bodyPr lIns="0" tIns="0" rIns="0" bIns="0" anchor="t">
             <a:normAutofit/>
           </a:bodyPr>
-          <a:p>
-            <a:endParaRPr b="0" lang="en-US" sz="3200" spc="-1" strike="noStrike">
+          <a:lstStyle/>
+          <a:p>
+            <a:endParaRPr lang="en-US" sz="3200" b="0" strike="noStrike" spc="-1">
               <a:latin typeface="Arial"/>
             </a:endParaRPr>
           </a:p>
@@ -1121,6 +1255,7 @@
         <p:spPr/>
         <p:txBody>
           <a:bodyPr/>
+          <a:lstStyle/>
           <a:p>
             <a:r>
               <a:t>Footer</a:t>
@@ -1141,10 +1276,12 @@
         <p:spPr/>
         <p:txBody>
           <a:bodyPr/>
-          <a:p>
-            <a:fld id="{C5BE59BF-E969-4400-860F-2B31B8E0E8DE}" type="slidenum">
-              <a:t>&lt;#&gt;</a:t>
+          <a:lstStyle/>
+          <a:p>
+            <a:fld id="{F0B3C06F-3603-494A-8057-0905794AE272}" type="slidenum">
+              <a:t>‹#›</a:t>
             </a:fld>
+            <a:endParaRPr/>
           </a:p>
         </p:txBody>
       </p:sp>
@@ -1161,21 +1298,22 @@
         <p:spPr/>
         <p:txBody>
           <a:bodyPr/>
-          <a:p>
-            <a:r>
-              <a:rPr lang="en-US"/>
-              <a:t/>
-            </a:r>
+          <a:lstStyle/>
+          <a:p>
+            <a:endParaRPr/>
           </a:p>
         </p:txBody>
       </p:sp>
     </p:spTree>
   </p:cSld>
+  <p:clrMapOvr>
+    <a:masterClrMapping/>
+  </p:clrMapOvr>
 </p:sldLayout>
 </file>
 
 <file path=ppt/slideLayouts/slideLayout4.xml><?xml version="1.0" encoding="utf-8"?>
-<p:sldLayout xmlns:a="http://schemas.openxmlformats.org/drawingml/2006/main" xmlns:p="http://schemas.openxmlformats.org/presentationml/2006/main" xmlns:r="http://schemas.openxmlformats.org/officeDocument/2006/relationships" xmlns:p14="http://schemas.microsoft.com/office/powerpoint/2010/main" xmlns:p15="http://schemas.microsoft.com/office/powerpoint/2012/main" xmlns:mc="http://schemas.openxmlformats.org/markup-compatibility/2006" type="twoObj" preserve="1">
+<p:sldLayout xmlns:a="http://schemas.openxmlformats.org/drawingml/2006/main" xmlns:r="http://schemas.openxmlformats.org/officeDocument/2006/relationships" xmlns:p="http://schemas.openxmlformats.org/presentationml/2006/main" type="twoObj" preserve="1">
   <p:cSld name="Title, 2 Content">
     <p:spTree>
       <p:nvGrpSpPr>
@@ -1193,7 +1331,7 @@
       </p:grpSpPr>
       <p:sp>
         <p:nvSpPr>
-          <p:cNvPr id="8" name="PlaceHolder 1"/>
+          <p:cNvPr id="9" name="PlaceHolder 1"/>
           <p:cNvSpPr>
             <a:spLocks noGrp="1"/>
           </p:cNvSpPr>
@@ -1204,7 +1342,7 @@
         <p:spPr>
           <a:xfrm>
             <a:off x="1523880" y="1122480"/>
-            <a:ext cx="9143280" cy="2386800"/>
+            <a:ext cx="9142920" cy="2386440"/>
           </a:xfrm>
           <a:prstGeom prst="rect">
             <a:avLst/>
@@ -1215,14 +1353,15 @@
           </a:ln>
         </p:spPr>
         <p:txBody>
-          <a:bodyPr lIns="0" rIns="0" tIns="0" bIns="0" anchor="ctr">
+          <a:bodyPr lIns="0" tIns="0" rIns="0" bIns="0" anchor="ctr">
             <a:noAutofit/>
           </a:bodyPr>
+          <a:lstStyle/>
           <a:p>
             <a:pPr algn="ctr">
               <a:buNone/>
             </a:pPr>
-            <a:endParaRPr b="0" lang="en-US" sz="4400" spc="-1" strike="noStrike">
+            <a:endParaRPr lang="en-US" sz="4400" b="0" strike="noStrike" spc="-1">
               <a:latin typeface="Arial"/>
             </a:endParaRPr>
           </a:p>
@@ -1230,7 +1369,7 @@
       </p:sp>
       <p:sp>
         <p:nvSpPr>
-          <p:cNvPr id="9" name="PlaceHolder 2"/>
+          <p:cNvPr id="10" name="PlaceHolder 2"/>
           <p:cNvSpPr>
             <a:spLocks noGrp="1"/>
           </p:cNvSpPr>
@@ -1241,7 +1380,7 @@
         <p:spPr>
           <a:xfrm>
             <a:off x="609480" y="1604520"/>
-            <a:ext cx="5354280" cy="3977280"/>
+            <a:ext cx="5354280" cy="3976920"/>
           </a:xfrm>
           <a:prstGeom prst="rect">
             <a:avLst/>
@@ -1252,11 +1391,12 @@
           </a:ln>
         </p:spPr>
         <p:txBody>
-          <a:bodyPr lIns="0" rIns="0" tIns="0" bIns="0" anchor="t">
+          <a:bodyPr lIns="0" tIns="0" rIns="0" bIns="0" anchor="t">
             <a:normAutofit/>
           </a:bodyPr>
-          <a:p>
-            <a:endParaRPr b="0" lang="en-US" sz="3200" spc="-1" strike="noStrike">
+          <a:lstStyle/>
+          <a:p>
+            <a:endParaRPr lang="en-US" sz="3200" b="0" strike="noStrike" spc="-1">
               <a:latin typeface="Arial"/>
             </a:endParaRPr>
           </a:p>
@@ -1264,7 +1404,7 @@
       </p:sp>
       <p:sp>
         <p:nvSpPr>
-          <p:cNvPr id="10" name="PlaceHolder 3"/>
+          <p:cNvPr id="11" name="PlaceHolder 3"/>
           <p:cNvSpPr>
             <a:spLocks noGrp="1"/>
           </p:cNvSpPr>
@@ -1275,7 +1415,7 @@
         <p:spPr>
           <a:xfrm>
             <a:off x="6231960" y="1604520"/>
-            <a:ext cx="5354280" cy="3977280"/>
+            <a:ext cx="5354280" cy="3976920"/>
           </a:xfrm>
           <a:prstGeom prst="rect">
             <a:avLst/>
@@ -1286,11 +1426,12 @@
           </a:ln>
         </p:spPr>
         <p:txBody>
-          <a:bodyPr lIns="0" rIns="0" tIns="0" bIns="0" anchor="t">
+          <a:bodyPr lIns="0" tIns="0" rIns="0" bIns="0" anchor="t">
             <a:normAutofit/>
           </a:bodyPr>
-          <a:p>
-            <a:endParaRPr b="0" lang="en-US" sz="3200" spc="-1" strike="noStrike">
+          <a:lstStyle/>
+          <a:p>
+            <a:endParaRPr lang="en-US" sz="3200" b="0" strike="noStrike" spc="-1">
               <a:latin typeface="Arial"/>
             </a:endParaRPr>
           </a:p>
@@ -1309,6 +1450,7 @@
         <p:spPr/>
         <p:txBody>
           <a:bodyPr/>
+          <a:lstStyle/>
           <a:p>
             <a:r>
               <a:t>Footer</a:t>
@@ -1329,10 +1471,12 @@
         <p:spPr/>
         <p:txBody>
           <a:bodyPr/>
-          <a:p>
-            <a:fld id="{CE31F53E-8351-4682-BA61-251529B3BC97}" type="slidenum">
-              <a:t>&lt;#&gt;</a:t>
+          <a:lstStyle/>
+          <a:p>
+            <a:fld id="{C47C99EE-8F65-434F-B21A-8CC01370C429}" type="slidenum">
+              <a:t>‹#›</a:t>
             </a:fld>
+            <a:endParaRPr/>
           </a:p>
         </p:txBody>
       </p:sp>
@@ -1349,21 +1493,22 @@
         <p:spPr/>
         <p:txBody>
           <a:bodyPr/>
-          <a:p>
-            <a:r>
-              <a:rPr lang="en-US"/>
-              <a:t/>
-            </a:r>
+          <a:lstStyle/>
+          <a:p>
+            <a:endParaRPr/>
           </a:p>
         </p:txBody>
       </p:sp>
     </p:spTree>
   </p:cSld>
+  <p:clrMapOvr>
+    <a:masterClrMapping/>
+  </p:clrMapOvr>
 </p:sldLayout>
 </file>
 
 <file path=ppt/slideLayouts/slideLayout5.xml><?xml version="1.0" encoding="utf-8"?>
-<p:sldLayout xmlns:a="http://schemas.openxmlformats.org/drawingml/2006/main" xmlns:p="http://schemas.openxmlformats.org/presentationml/2006/main" xmlns:r="http://schemas.openxmlformats.org/officeDocument/2006/relationships" xmlns:p14="http://schemas.microsoft.com/office/powerpoint/2010/main" xmlns:p15="http://schemas.microsoft.com/office/powerpoint/2012/main" xmlns:mc="http://schemas.openxmlformats.org/markup-compatibility/2006" type="titleOnly" preserve="1">
+<p:sldLayout xmlns:a="http://schemas.openxmlformats.org/drawingml/2006/main" xmlns:r="http://schemas.openxmlformats.org/officeDocument/2006/relationships" xmlns:p="http://schemas.openxmlformats.org/presentationml/2006/main" type="titleOnly" preserve="1">
   <p:cSld name="Title Only">
     <p:spTree>
       <p:nvGrpSpPr>
@@ -1381,7 +1526,7 @@
       </p:grpSpPr>
       <p:sp>
         <p:nvSpPr>
-          <p:cNvPr id="11" name="PlaceHolder 1"/>
+          <p:cNvPr id="12" name="PlaceHolder 1"/>
           <p:cNvSpPr>
             <a:spLocks noGrp="1"/>
           </p:cNvSpPr>
@@ -1392,7 +1537,7 @@
         <p:spPr>
           <a:xfrm>
             <a:off x="1523880" y="1122480"/>
-            <a:ext cx="9143280" cy="2386800"/>
+            <a:ext cx="9142920" cy="2386440"/>
           </a:xfrm>
           <a:prstGeom prst="rect">
             <a:avLst/>
@@ -1403,14 +1548,15 @@
           </a:ln>
         </p:spPr>
         <p:txBody>
-          <a:bodyPr lIns="0" rIns="0" tIns="0" bIns="0" anchor="ctr">
+          <a:bodyPr lIns="0" tIns="0" rIns="0" bIns="0" anchor="ctr">
             <a:noAutofit/>
           </a:bodyPr>
+          <a:lstStyle/>
           <a:p>
             <a:pPr algn="ctr">
               <a:buNone/>
             </a:pPr>
-            <a:endParaRPr b="0" lang="en-US" sz="4400" spc="-1" strike="noStrike">
+            <a:endParaRPr lang="en-US" sz="4400" b="0" strike="noStrike" spc="-1">
               <a:latin typeface="Arial"/>
             </a:endParaRPr>
           </a:p>
@@ -1429,6 +1575,7 @@
         <p:spPr/>
         <p:txBody>
           <a:bodyPr/>
+          <a:lstStyle/>
           <a:p>
             <a:r>
               <a:t>Footer</a:t>
@@ -1449,10 +1596,12 @@
         <p:spPr/>
         <p:txBody>
           <a:bodyPr/>
-          <a:p>
-            <a:fld id="{502A6E28-192E-45E8-959E-CB901DD8A41B}" type="slidenum">
-              <a:t>&lt;#&gt;</a:t>
+          <a:lstStyle/>
+          <a:p>
+            <a:fld id="{E1A4E8F6-6BC0-4CF0-9760-12A7A132924A}" type="slidenum">
+              <a:t>‹#›</a:t>
             </a:fld>
+            <a:endParaRPr/>
           </a:p>
         </p:txBody>
       </p:sp>
@@ -1469,21 +1618,22 @@
         <p:spPr/>
         <p:txBody>
           <a:bodyPr/>
-          <a:p>
-            <a:r>
-              <a:rPr lang="en-US"/>
-              <a:t/>
-            </a:r>
+          <a:lstStyle/>
+          <a:p>
+            <a:endParaRPr/>
           </a:p>
         </p:txBody>
       </p:sp>
     </p:spTree>
   </p:cSld>
+  <p:clrMapOvr>
+    <a:masterClrMapping/>
+  </p:clrMapOvr>
 </p:sldLayout>
 </file>
 
 <file path=ppt/slideLayouts/slideLayout6.xml><?xml version="1.0" encoding="utf-8"?>
-<p:sldLayout xmlns:a="http://schemas.openxmlformats.org/drawingml/2006/main" xmlns:p="http://schemas.openxmlformats.org/presentationml/2006/main" xmlns:r="http://schemas.openxmlformats.org/officeDocument/2006/relationships" xmlns:p14="http://schemas.microsoft.com/office/powerpoint/2010/main" xmlns:p15="http://schemas.microsoft.com/office/powerpoint/2012/main" xmlns:mc="http://schemas.openxmlformats.org/markup-compatibility/2006" type="objOnly" preserve="1">
+<p:sldLayout xmlns:a="http://schemas.openxmlformats.org/drawingml/2006/main" xmlns:r="http://schemas.openxmlformats.org/officeDocument/2006/relationships" xmlns:p="http://schemas.openxmlformats.org/presentationml/2006/main" type="objOnly" preserve="1">
   <p:cSld name="Centered Text">
     <p:spTree>
       <p:nvGrpSpPr>
@@ -1501,7 +1651,7 @@
       </p:grpSpPr>
       <p:sp>
         <p:nvSpPr>
-          <p:cNvPr id="12" name="PlaceHolder 1"/>
+          <p:cNvPr id="13" name="PlaceHolder 1"/>
           <p:cNvSpPr>
             <a:spLocks noGrp="1"/>
           </p:cNvSpPr>
@@ -1512,7 +1662,7 @@
         <p:spPr>
           <a:xfrm>
             <a:off x="1523880" y="1122480"/>
-            <a:ext cx="9143280" cy="11064960"/>
+            <a:ext cx="9142920" cy="11063520"/>
           </a:xfrm>
           <a:prstGeom prst="rect">
             <a:avLst/>
@@ -1523,14 +1673,15 @@
           </a:ln>
         </p:spPr>
         <p:txBody>
-          <a:bodyPr lIns="0" rIns="0" tIns="0" bIns="0" anchor="ctr">
+          <a:bodyPr lIns="0" tIns="0" rIns="0" bIns="0" anchor="ctr">
             <a:noAutofit/>
           </a:bodyPr>
+          <a:lstStyle/>
           <a:p>
             <a:pPr algn="ctr">
               <a:buNone/>
             </a:pPr>
-            <a:endParaRPr b="0" lang="en-US" sz="3200" spc="-1" strike="noStrike">
+            <a:endParaRPr lang="en-US" sz="3200" b="0" strike="noStrike" spc="-1">
               <a:latin typeface="Arial"/>
             </a:endParaRPr>
           </a:p>
@@ -1549,6 +1700,7 @@
         <p:spPr/>
         <p:txBody>
           <a:bodyPr/>
+          <a:lstStyle/>
           <a:p>
             <a:r>
               <a:t>Footer</a:t>
@@ -1569,10 +1721,12 @@
         <p:spPr/>
         <p:txBody>
           <a:bodyPr/>
-          <a:p>
-            <a:fld id="{CD790931-4517-45E3-A402-18757621E08E}" type="slidenum">
-              <a:t>&lt;#&gt;</a:t>
+          <a:lstStyle/>
+          <a:p>
+            <a:fld id="{1AAAE919-6F46-4212-BD4D-F98848A2C53B}" type="slidenum">
+              <a:t>‹#›</a:t>
             </a:fld>
+            <a:endParaRPr/>
           </a:p>
         </p:txBody>
       </p:sp>
@@ -1589,21 +1743,22 @@
         <p:spPr/>
         <p:txBody>
           <a:bodyPr/>
-          <a:p>
-            <a:r>
-              <a:rPr lang="en-US"/>
-              <a:t/>
-            </a:r>
+          <a:lstStyle/>
+          <a:p>
+            <a:endParaRPr/>
           </a:p>
         </p:txBody>
       </p:sp>
     </p:spTree>
   </p:cSld>
+  <p:clrMapOvr>
+    <a:masterClrMapping/>
+  </p:clrMapOvr>
 </p:sldLayout>
 </file>
 
 <file path=ppt/slideLayouts/slideLayout7.xml><?xml version="1.0" encoding="utf-8"?>
-<p:sldLayout xmlns:a="http://schemas.openxmlformats.org/drawingml/2006/main" xmlns:p="http://schemas.openxmlformats.org/presentationml/2006/main" xmlns:r="http://schemas.openxmlformats.org/officeDocument/2006/relationships" xmlns:p14="http://schemas.microsoft.com/office/powerpoint/2010/main" xmlns:p15="http://schemas.microsoft.com/office/powerpoint/2012/main" xmlns:mc="http://schemas.openxmlformats.org/markup-compatibility/2006" type="twoObjAndObj" preserve="1">
+<p:sldLayout xmlns:a="http://schemas.openxmlformats.org/drawingml/2006/main" xmlns:r="http://schemas.openxmlformats.org/officeDocument/2006/relationships" xmlns:p="http://schemas.openxmlformats.org/presentationml/2006/main" type="twoObjAndObj" preserve="1">
   <p:cSld name="Title, 2 Content and Content">
     <p:spTree>
       <p:nvGrpSpPr>
@@ -1621,7 +1776,7 @@
       </p:grpSpPr>
       <p:sp>
         <p:nvSpPr>
-          <p:cNvPr id="13" name="PlaceHolder 1"/>
+          <p:cNvPr id="14" name="PlaceHolder 1"/>
           <p:cNvSpPr>
             <a:spLocks noGrp="1"/>
           </p:cNvSpPr>
@@ -1632,7 +1787,7 @@
         <p:spPr>
           <a:xfrm>
             <a:off x="1523880" y="1122480"/>
-            <a:ext cx="9143280" cy="2386800"/>
+            <a:ext cx="9142920" cy="2386440"/>
           </a:xfrm>
           <a:prstGeom prst="rect">
             <a:avLst/>
@@ -1643,14 +1798,15 @@
           </a:ln>
         </p:spPr>
         <p:txBody>
-          <a:bodyPr lIns="0" rIns="0" tIns="0" bIns="0" anchor="ctr">
+          <a:bodyPr lIns="0" tIns="0" rIns="0" bIns="0" anchor="ctr">
             <a:noAutofit/>
           </a:bodyPr>
+          <a:lstStyle/>
           <a:p>
             <a:pPr algn="ctr">
               <a:buNone/>
             </a:pPr>
-            <a:endParaRPr b="0" lang="en-US" sz="4400" spc="-1" strike="noStrike">
+            <a:endParaRPr lang="en-US" sz="4400" b="0" strike="noStrike" spc="-1">
               <a:latin typeface="Arial"/>
             </a:endParaRPr>
           </a:p>
@@ -1658,7 +1814,7 @@
       </p:sp>
       <p:sp>
         <p:nvSpPr>
-          <p:cNvPr id="14" name="PlaceHolder 2"/>
+          <p:cNvPr id="15" name="PlaceHolder 2"/>
           <p:cNvSpPr>
             <a:spLocks noGrp="1"/>
           </p:cNvSpPr>
@@ -1680,11 +1836,12 @@
           </a:ln>
         </p:spPr>
         <p:txBody>
-          <a:bodyPr lIns="0" rIns="0" tIns="0" bIns="0" anchor="t">
+          <a:bodyPr lIns="0" tIns="0" rIns="0" bIns="0" anchor="t">
             <a:normAutofit/>
           </a:bodyPr>
-          <a:p>
-            <a:endParaRPr b="0" lang="en-US" sz="3200" spc="-1" strike="noStrike">
+          <a:lstStyle/>
+          <a:p>
+            <a:endParaRPr lang="en-US" sz="3200" b="0" strike="noStrike" spc="-1">
               <a:latin typeface="Arial"/>
             </a:endParaRPr>
           </a:p>
@@ -1692,7 +1849,7 @@
       </p:sp>
       <p:sp>
         <p:nvSpPr>
-          <p:cNvPr id="15" name="PlaceHolder 3"/>
+          <p:cNvPr id="16" name="PlaceHolder 3"/>
           <p:cNvSpPr>
             <a:spLocks noGrp="1"/>
           </p:cNvSpPr>
@@ -1703,7 +1860,7 @@
         <p:spPr>
           <a:xfrm>
             <a:off x="6231960" y="1604520"/>
-            <a:ext cx="5354280" cy="3977280"/>
+            <a:ext cx="5354280" cy="3976920"/>
           </a:xfrm>
           <a:prstGeom prst="rect">
             <a:avLst/>
@@ -1714,11 +1871,12 @@
           </a:ln>
         </p:spPr>
         <p:txBody>
-          <a:bodyPr lIns="0" rIns="0" tIns="0" bIns="0" anchor="t">
+          <a:bodyPr lIns="0" tIns="0" rIns="0" bIns="0" anchor="t">
             <a:normAutofit/>
           </a:bodyPr>
-          <a:p>
-            <a:endParaRPr b="0" lang="en-US" sz="3200" spc="-1" strike="noStrike">
+          <a:lstStyle/>
+          <a:p>
+            <a:endParaRPr lang="en-US" sz="3200" b="0" strike="noStrike" spc="-1">
               <a:latin typeface="Arial"/>
             </a:endParaRPr>
           </a:p>
@@ -1726,7 +1884,7 @@
       </p:sp>
       <p:sp>
         <p:nvSpPr>
-          <p:cNvPr id="16" name="PlaceHolder 4"/>
+          <p:cNvPr id="17" name="PlaceHolder 4"/>
           <p:cNvSpPr>
             <a:spLocks noGrp="1"/>
           </p:cNvSpPr>
@@ -1748,11 +1906,12 @@
           </a:ln>
         </p:spPr>
         <p:txBody>
-          <a:bodyPr lIns="0" rIns="0" tIns="0" bIns="0" anchor="t">
+          <a:bodyPr lIns="0" tIns="0" rIns="0" bIns="0" anchor="t">
             <a:normAutofit/>
           </a:bodyPr>
-          <a:p>
-            <a:endParaRPr b="0" lang="en-US" sz="3200" spc="-1" strike="noStrike">
+          <a:lstStyle/>
+          <a:p>
+            <a:endParaRPr lang="en-US" sz="3200" b="0" strike="noStrike" spc="-1">
               <a:latin typeface="Arial"/>
             </a:endParaRPr>
           </a:p>
@@ -1771,6 +1930,7 @@
         <p:spPr/>
         <p:txBody>
           <a:bodyPr/>
+          <a:lstStyle/>
           <a:p>
             <a:r>
               <a:t>Footer</a:t>
@@ -1791,10 +1951,12 @@
         <p:spPr/>
         <p:txBody>
           <a:bodyPr/>
-          <a:p>
-            <a:fld id="{5225ED93-EC84-4EB7-9E80-4E9BA32D06F8}" type="slidenum">
-              <a:t>&lt;#&gt;</a:t>
+          <a:lstStyle/>
+          <a:p>
+            <a:fld id="{3E372A99-9D28-4563-902B-2A773ACDC292}" type="slidenum">
+              <a:t>‹#›</a:t>
             </a:fld>
+            <a:endParaRPr/>
           </a:p>
         </p:txBody>
       </p:sp>
@@ -1811,21 +1973,22 @@
         <p:spPr/>
         <p:txBody>
           <a:bodyPr/>
-          <a:p>
-            <a:r>
-              <a:rPr lang="en-US"/>
-              <a:t/>
-            </a:r>
+          <a:lstStyle/>
+          <a:p>
+            <a:endParaRPr/>
           </a:p>
         </p:txBody>
       </p:sp>
     </p:spTree>
   </p:cSld>
+  <p:clrMapOvr>
+    <a:masterClrMapping/>
+  </p:clrMapOvr>
 </p:sldLayout>
 </file>
 
 <file path=ppt/slideLayouts/slideLayout8.xml><?xml version="1.0" encoding="utf-8"?>
-<p:sldLayout xmlns:a="http://schemas.openxmlformats.org/drawingml/2006/main" xmlns:p="http://schemas.openxmlformats.org/presentationml/2006/main" xmlns:r="http://schemas.openxmlformats.org/officeDocument/2006/relationships" xmlns:p14="http://schemas.microsoft.com/office/powerpoint/2010/main" xmlns:p15="http://schemas.microsoft.com/office/powerpoint/2012/main" xmlns:mc="http://schemas.openxmlformats.org/markup-compatibility/2006" type="objAndTwoObj" preserve="1">
+<p:sldLayout xmlns:a="http://schemas.openxmlformats.org/drawingml/2006/main" xmlns:r="http://schemas.openxmlformats.org/officeDocument/2006/relationships" xmlns:p="http://schemas.openxmlformats.org/presentationml/2006/main" type="objAndTwoObj" preserve="1">
   <p:cSld name="Title Content and 2 Content">
     <p:spTree>
       <p:nvGrpSpPr>
@@ -1843,7 +2006,7 @@
       </p:grpSpPr>
       <p:sp>
         <p:nvSpPr>
-          <p:cNvPr id="17" name="PlaceHolder 1"/>
+          <p:cNvPr id="18" name="PlaceHolder 1"/>
           <p:cNvSpPr>
             <a:spLocks noGrp="1"/>
           </p:cNvSpPr>
@@ -1854,7 +2017,7 @@
         <p:spPr>
           <a:xfrm>
             <a:off x="1523880" y="1122480"/>
-            <a:ext cx="9143280" cy="2386800"/>
+            <a:ext cx="9142920" cy="2386440"/>
           </a:xfrm>
           <a:prstGeom prst="rect">
             <a:avLst/>
@@ -1865,14 +2028,15 @@
           </a:ln>
         </p:spPr>
         <p:txBody>
-          <a:bodyPr lIns="0" rIns="0" tIns="0" bIns="0" anchor="ctr">
+          <a:bodyPr lIns="0" tIns="0" rIns="0" bIns="0" anchor="ctr">
             <a:noAutofit/>
           </a:bodyPr>
+          <a:lstStyle/>
           <a:p>
             <a:pPr algn="ctr">
               <a:buNone/>
             </a:pPr>
-            <a:endParaRPr b="0" lang="en-US" sz="4400" spc="-1" strike="noStrike">
+            <a:endParaRPr lang="en-US" sz="4400" b="0" strike="noStrike" spc="-1">
               <a:latin typeface="Arial"/>
             </a:endParaRPr>
           </a:p>
@@ -1880,7 +2044,7 @@
       </p:sp>
       <p:sp>
         <p:nvSpPr>
-          <p:cNvPr id="18" name="PlaceHolder 2"/>
+          <p:cNvPr id="19" name="PlaceHolder 2"/>
           <p:cNvSpPr>
             <a:spLocks noGrp="1"/>
           </p:cNvSpPr>
@@ -1891,7 +2055,7 @@
         <p:spPr>
           <a:xfrm>
             <a:off x="609480" y="1604520"/>
-            <a:ext cx="5354280" cy="3977280"/>
+            <a:ext cx="5354280" cy="3976920"/>
           </a:xfrm>
           <a:prstGeom prst="rect">
             <a:avLst/>
@@ -1902,11 +2066,12 @@
           </a:ln>
         </p:spPr>
         <p:txBody>
-          <a:bodyPr lIns="0" rIns="0" tIns="0" bIns="0" anchor="t">
+          <a:bodyPr lIns="0" tIns="0" rIns="0" bIns="0" anchor="t">
             <a:normAutofit/>
           </a:bodyPr>
-          <a:p>
-            <a:endParaRPr b="0" lang="en-US" sz="3200" spc="-1" strike="noStrike">
+          <a:lstStyle/>
+          <a:p>
+            <a:endParaRPr lang="en-US" sz="3200" b="0" strike="noStrike" spc="-1">
               <a:latin typeface="Arial"/>
             </a:endParaRPr>
           </a:p>
@@ -1914,7 +2079,7 @@
       </p:sp>
       <p:sp>
         <p:nvSpPr>
-          <p:cNvPr id="19" name="PlaceHolder 3"/>
+          <p:cNvPr id="20" name="PlaceHolder 3"/>
           <p:cNvSpPr>
             <a:spLocks noGrp="1"/>
           </p:cNvSpPr>
@@ -1936,11 +2101,12 @@
           </a:ln>
         </p:spPr>
         <p:txBody>
-          <a:bodyPr lIns="0" rIns="0" tIns="0" bIns="0" anchor="t">
+          <a:bodyPr lIns="0" tIns="0" rIns="0" bIns="0" anchor="t">
             <a:normAutofit/>
           </a:bodyPr>
-          <a:p>
-            <a:endParaRPr b="0" lang="en-US" sz="3200" spc="-1" strike="noStrike">
+          <a:lstStyle/>
+          <a:p>
+            <a:endParaRPr lang="en-US" sz="3200" b="0" strike="noStrike" spc="-1">
               <a:latin typeface="Arial"/>
             </a:endParaRPr>
           </a:p>
@@ -1948,7 +2114,7 @@
       </p:sp>
       <p:sp>
         <p:nvSpPr>
-          <p:cNvPr id="20" name="PlaceHolder 4"/>
+          <p:cNvPr id="21" name="PlaceHolder 4"/>
           <p:cNvSpPr>
             <a:spLocks noGrp="1"/>
           </p:cNvSpPr>
@@ -1970,11 +2136,12 @@
           </a:ln>
         </p:spPr>
         <p:txBody>
-          <a:bodyPr lIns="0" rIns="0" tIns="0" bIns="0" anchor="t">
+          <a:bodyPr lIns="0" tIns="0" rIns="0" bIns="0" anchor="t">
             <a:normAutofit/>
           </a:bodyPr>
-          <a:p>
-            <a:endParaRPr b="0" lang="en-US" sz="3200" spc="-1" strike="noStrike">
+          <a:lstStyle/>
+          <a:p>
+            <a:endParaRPr lang="en-US" sz="3200" b="0" strike="noStrike" spc="-1">
               <a:latin typeface="Arial"/>
             </a:endParaRPr>
           </a:p>
@@ -1993,6 +2160,7 @@
         <p:spPr/>
         <p:txBody>
           <a:bodyPr/>
+          <a:lstStyle/>
           <a:p>
             <a:r>
               <a:t>Footer</a:t>
@@ -2013,10 +2181,12 @@
         <p:spPr/>
         <p:txBody>
           <a:bodyPr/>
-          <a:p>
-            <a:fld id="{D02F380A-6B7D-4FD3-8CA2-59812CC4FF5F}" type="slidenum">
-              <a:t>&lt;#&gt;</a:t>
+          <a:lstStyle/>
+          <a:p>
+            <a:fld id="{A1EB5B39-CA8A-4FD2-BAE8-9E5478F0A5A7}" type="slidenum">
+              <a:t>‹#›</a:t>
             </a:fld>
+            <a:endParaRPr/>
           </a:p>
         </p:txBody>
       </p:sp>
@@ -2033,21 +2203,22 @@
         <p:spPr/>
         <p:txBody>
           <a:bodyPr/>
-          <a:p>
-            <a:r>
-              <a:rPr lang="en-US"/>
-              <a:t/>
-            </a:r>
+          <a:lstStyle/>
+          <a:p>
+            <a:endParaRPr/>
           </a:p>
         </p:txBody>
       </p:sp>
     </p:spTree>
   </p:cSld>
+  <p:clrMapOvr>
+    <a:masterClrMapping/>
+  </p:clrMapOvr>
 </p:sldLayout>
 </file>
 
 <file path=ppt/slideLayouts/slideLayout9.xml><?xml version="1.0" encoding="utf-8"?>
-<p:sldLayout xmlns:a="http://schemas.openxmlformats.org/drawingml/2006/main" xmlns:p="http://schemas.openxmlformats.org/presentationml/2006/main" xmlns:r="http://schemas.openxmlformats.org/officeDocument/2006/relationships" xmlns:p14="http://schemas.microsoft.com/office/powerpoint/2010/main" xmlns:p15="http://schemas.microsoft.com/office/powerpoint/2012/main" xmlns:mc="http://schemas.openxmlformats.org/markup-compatibility/2006" type="twoObjOverTx" preserve="1">
+<p:sldLayout xmlns:a="http://schemas.openxmlformats.org/drawingml/2006/main" xmlns:r="http://schemas.openxmlformats.org/officeDocument/2006/relationships" xmlns:p="http://schemas.openxmlformats.org/presentationml/2006/main" type="twoObjOverTx" preserve="1">
   <p:cSld name="Title, 2 Content over Content">
     <p:spTree>
       <p:nvGrpSpPr>
@@ -2065,7 +2236,7 @@
       </p:grpSpPr>
       <p:sp>
         <p:nvSpPr>
-          <p:cNvPr id="21" name="PlaceHolder 1"/>
+          <p:cNvPr id="22" name="PlaceHolder 1"/>
           <p:cNvSpPr>
             <a:spLocks noGrp="1"/>
           </p:cNvSpPr>
@@ -2076,7 +2247,7 @@
         <p:spPr>
           <a:xfrm>
             <a:off x="1523880" y="1122480"/>
-            <a:ext cx="9143280" cy="2386800"/>
+            <a:ext cx="9142920" cy="2386440"/>
           </a:xfrm>
           <a:prstGeom prst="rect">
             <a:avLst/>
@@ -2087,14 +2258,15 @@
           </a:ln>
         </p:spPr>
         <p:txBody>
-          <a:bodyPr lIns="0" rIns="0" tIns="0" bIns="0" anchor="ctr">
+          <a:bodyPr lIns="0" tIns="0" rIns="0" bIns="0" anchor="ctr">
             <a:noAutofit/>
           </a:bodyPr>
+          <a:lstStyle/>
           <a:p>
             <a:pPr algn="ctr">
               <a:buNone/>
             </a:pPr>
-            <a:endParaRPr b="0" lang="en-US" sz="4400" spc="-1" strike="noStrike">
+            <a:endParaRPr lang="en-US" sz="4400" b="0" strike="noStrike" spc="-1">
               <a:latin typeface="Arial"/>
             </a:endParaRPr>
           </a:p>
@@ -2102,7 +2274,7 @@
       </p:sp>
       <p:sp>
         <p:nvSpPr>
-          <p:cNvPr id="22" name="PlaceHolder 2"/>
+          <p:cNvPr id="23" name="PlaceHolder 2"/>
           <p:cNvSpPr>
             <a:spLocks noGrp="1"/>
           </p:cNvSpPr>
@@ -2124,11 +2296,12 @@
           </a:ln>
         </p:spPr>
         <p:txBody>
-          <a:bodyPr lIns="0" rIns="0" tIns="0" bIns="0" anchor="t">
+          <a:bodyPr lIns="0" tIns="0" rIns="0" bIns="0" anchor="t">
             <a:normAutofit/>
           </a:bodyPr>
-          <a:p>
-            <a:endParaRPr b="0" lang="en-US" sz="3200" spc="-1" strike="noStrike">
+          <a:lstStyle/>
+          <a:p>
+            <a:endParaRPr lang="en-US" sz="3200" b="0" strike="noStrike" spc="-1">
               <a:latin typeface="Arial"/>
             </a:endParaRPr>
           </a:p>
@@ -2136,7 +2309,7 @@
       </p:sp>
       <p:sp>
         <p:nvSpPr>
-          <p:cNvPr id="23" name="PlaceHolder 3"/>
+          <p:cNvPr id="24" name="PlaceHolder 3"/>
           <p:cNvSpPr>
             <a:spLocks noGrp="1"/>
           </p:cNvSpPr>
@@ -2158,11 +2331,12 @@
           </a:ln>
         </p:spPr>
         <p:txBody>
-          <a:bodyPr lIns="0" rIns="0" tIns="0" bIns="0" anchor="t">
+          <a:bodyPr lIns="0" tIns="0" rIns="0" bIns="0" anchor="t">
             <a:normAutofit/>
           </a:bodyPr>
-          <a:p>
-            <a:endParaRPr b="0" lang="en-US" sz="3200" spc="-1" strike="noStrike">
+          <a:lstStyle/>
+          <a:p>
+            <a:endParaRPr lang="en-US" sz="3200" b="0" strike="noStrike" spc="-1">
               <a:latin typeface="Arial"/>
             </a:endParaRPr>
           </a:p>
@@ -2170,7 +2344,7 @@
       </p:sp>
       <p:sp>
         <p:nvSpPr>
-          <p:cNvPr id="24" name="PlaceHolder 4"/>
+          <p:cNvPr id="25" name="PlaceHolder 4"/>
           <p:cNvSpPr>
             <a:spLocks noGrp="1"/>
           </p:cNvSpPr>
@@ -2181,7 +2355,7 @@
         <p:spPr>
           <a:xfrm>
             <a:off x="609480" y="3682080"/>
-            <a:ext cx="10972440" cy="1896840"/>
+            <a:ext cx="10972080" cy="1896840"/>
           </a:xfrm>
           <a:prstGeom prst="rect">
             <a:avLst/>
@@ -2192,11 +2366,12 @@
           </a:ln>
         </p:spPr>
         <p:txBody>
-          <a:bodyPr lIns="0" rIns="0" tIns="0" bIns="0" anchor="t">
+          <a:bodyPr lIns="0" tIns="0" rIns="0" bIns="0" anchor="t">
             <a:normAutofit/>
           </a:bodyPr>
-          <a:p>
-            <a:endParaRPr b="0" lang="en-US" sz="3200" spc="-1" strike="noStrike">
+          <a:lstStyle/>
+          <a:p>
+            <a:endParaRPr lang="en-US" sz="3200" b="0" strike="noStrike" spc="-1">
               <a:latin typeface="Arial"/>
             </a:endParaRPr>
           </a:p>
@@ -2215,6 +2390,7 @@
         <p:spPr/>
         <p:txBody>
           <a:bodyPr/>
+          <a:lstStyle/>
           <a:p>
             <a:r>
               <a:t>Footer</a:t>
@@ -2235,10 +2411,12 @@
         <p:spPr/>
         <p:txBody>
           <a:bodyPr/>
-          <a:p>
-            <a:fld id="{F2F28029-8361-4671-BA5E-37961FCD0A6B}" type="slidenum">
-              <a:t>&lt;#&gt;</a:t>
+          <a:lstStyle/>
+          <a:p>
+            <a:fld id="{DF004044-31FF-49DD-AC10-D09226129E16}" type="slidenum">
+              <a:t>‹#›</a:t>
             </a:fld>
+            <a:endParaRPr/>
           </a:p>
         </p:txBody>
       </p:sp>
@@ -2255,27 +2433,29 @@
         <p:spPr/>
         <p:txBody>
           <a:bodyPr/>
-          <a:p>
-            <a:r>
-              <a:rPr lang="en-US"/>
-              <a:t/>
-            </a:r>
+          <a:lstStyle/>
+          <a:p>
+            <a:endParaRPr/>
           </a:p>
         </p:txBody>
       </p:sp>
     </p:spTree>
   </p:cSld>
+  <p:clrMapOvr>
+    <a:masterClrMapping/>
+  </p:clrMapOvr>
 </p:sldLayout>
 </file>
 
 <file path=ppt/slideMasters/slideMaster1.xml><?xml version="1.0" encoding="utf-8"?>
-<p:sldMaster xmlns:a="http://schemas.openxmlformats.org/drawingml/2006/main" xmlns:p="http://schemas.openxmlformats.org/presentationml/2006/main" xmlns:r="http://schemas.openxmlformats.org/officeDocument/2006/relationships" xmlns:p14="http://schemas.microsoft.com/office/powerpoint/2010/main" xmlns:p15="http://schemas.microsoft.com/office/powerpoint/2012/main" xmlns:mc="http://schemas.openxmlformats.org/markup-compatibility/2006">
+<p:sldMaster xmlns:a="http://schemas.openxmlformats.org/drawingml/2006/main" xmlns:r="http://schemas.openxmlformats.org/officeDocument/2006/relationships" xmlns:p="http://schemas.openxmlformats.org/presentationml/2006/main">
   <p:cSld>
     <p:bg>
       <p:bgPr>
         <a:solidFill>
-          <a:srgbClr val="ffffff"/>
+          <a:srgbClr val="FFFFFF"/>
         </a:solidFill>
+        <a:effectLst/>
       </p:bgPr>
     </p:bg>
     <p:spTree>
@@ -2294,7 +2474,7 @@
       </p:grpSpPr>
       <p:sp>
         <p:nvSpPr>
-          <p:cNvPr id="0" name="PlaceHolder 1"/>
+          <p:cNvPr id="5" name="PlaceHolder 1"/>
           <p:cNvSpPr>
             <a:spLocks noGrp="1"/>
           </p:cNvSpPr>
@@ -2305,7 +2485,7 @@
         <p:spPr>
           <a:xfrm>
             <a:off x="1523880" y="1122480"/>
-            <a:ext cx="9143280" cy="2386800"/>
+            <a:ext cx="9142920" cy="2386440"/>
           </a:xfrm>
           <a:prstGeom prst="rect">
             <a:avLst/>
@@ -2316,36 +2496,34 @@
           </a:ln>
         </p:spPr>
         <p:txBody>
-          <a:bodyPr lIns="0" rIns="0" tIns="0" bIns="0" anchor="ctr">
+          <a:bodyPr lIns="0" tIns="0" rIns="0" bIns="0" anchor="ctr">
             <a:noAutofit/>
           </a:bodyPr>
+          <a:lstStyle/>
           <a:p>
             <a:r>
-              <a:rPr b="0" lang="en-US" sz="1800" spc="-1" strike="noStrike">
+              <a:rPr lang="en-US" sz="1800" b="0" strike="noStrike" spc="-1">
                 <a:latin typeface="Arial"/>
               </a:rPr>
               <a:t>Click to edit the title text format</a:t>
             </a:r>
-            <a:endParaRPr b="0" lang="en-US" sz="1800" spc="-1" strike="noStrike">
-              <a:latin typeface="Arial"/>
-            </a:endParaRPr>
-          </a:p>
-        </p:txBody>
-      </p:sp>
-      <p:sp>
-        <p:nvSpPr>
-          <p:cNvPr id="1" name="PlaceHolder 2"/>
-          <p:cNvSpPr>
-            <a:spLocks noGrp="1"/>
-          </p:cNvSpPr>
-          <p:nvPr>
-            <p:ph type="ftr" idx="1"/>
+          </a:p>
+        </p:txBody>
+      </p:sp>
+      <p:sp>
+        <p:nvSpPr>
+          <p:cNvPr id="6" name="PlaceHolder 2"/>
+          <p:cNvSpPr>
+            <a:spLocks noGrp="1"/>
+          </p:cNvSpPr>
+          <p:nvPr>
+            <p:ph type="body"/>
           </p:nvPr>
         </p:nvSpPr>
         <p:spPr>
           <a:xfrm>
-            <a:off x="4038480" y="6356520"/>
-            <a:ext cx="4114080" cy="364320"/>
+            <a:off x="609480" y="1604520"/>
+            <a:ext cx="10972080" cy="3976920"/>
           </a:xfrm>
           <a:prstGeom prst="rect">
             <a:avLst/>
@@ -2356,7 +2534,170 @@
           </a:ln>
         </p:spPr>
         <p:txBody>
-          <a:bodyPr lIns="90000" rIns="90000" tIns="45000" bIns="45000" anchor="ctr">
+          <a:bodyPr lIns="0" tIns="0" rIns="0" bIns="0" anchor="t">
+            <a:normAutofit/>
+          </a:bodyPr>
+          <a:lstStyle/>
+          <a:p>
+            <a:pPr marL="432000" indent="-324000">
+              <a:spcBef>
+                <a:spcPts val="1417"/>
+              </a:spcBef>
+              <a:buClr>
+                <a:srgbClr val="000000"/>
+              </a:buClr>
+              <a:buSzPct val="45000"/>
+              <a:buFont typeface="Wingdings" charset="2"/>
+              <a:buChar char=""/>
+            </a:pPr>
+            <a:r>
+              <a:rPr lang="en-US" sz="1800" b="0" strike="noStrike" spc="-1">
+                <a:latin typeface="Arial"/>
+              </a:rPr>
+              <a:t>Click to edit the outline text format</a:t>
+            </a:r>
+          </a:p>
+          <a:p>
+            <a:pPr marL="864000" lvl="1" indent="-324000">
+              <a:spcBef>
+                <a:spcPts val="1134"/>
+              </a:spcBef>
+              <a:buClr>
+                <a:srgbClr val="000000"/>
+              </a:buClr>
+              <a:buSzPct val="75000"/>
+              <a:buFont typeface="Symbol" charset="2"/>
+              <a:buChar char=""/>
+            </a:pPr>
+            <a:r>
+              <a:rPr lang="en-US" sz="1800" b="0" strike="noStrike" spc="-1">
+                <a:latin typeface="Arial"/>
+              </a:rPr>
+              <a:t>Second Outline Level</a:t>
+            </a:r>
+          </a:p>
+          <a:p>
+            <a:pPr marL="1296000" lvl="2" indent="-288000">
+              <a:spcBef>
+                <a:spcPts val="850"/>
+              </a:spcBef>
+              <a:buClr>
+                <a:srgbClr val="000000"/>
+              </a:buClr>
+              <a:buSzPct val="45000"/>
+              <a:buFont typeface="Wingdings" charset="2"/>
+              <a:buChar char=""/>
+            </a:pPr>
+            <a:r>
+              <a:rPr lang="en-US" sz="1800" b="0" strike="noStrike" spc="-1">
+                <a:latin typeface="Arial"/>
+              </a:rPr>
+              <a:t>Third Outline Level</a:t>
+            </a:r>
+          </a:p>
+          <a:p>
+            <a:pPr marL="1728000" lvl="3" indent="-216000">
+              <a:spcBef>
+                <a:spcPts val="567"/>
+              </a:spcBef>
+              <a:buClr>
+                <a:srgbClr val="000000"/>
+              </a:buClr>
+              <a:buSzPct val="75000"/>
+              <a:buFont typeface="Symbol" charset="2"/>
+              <a:buChar char=""/>
+            </a:pPr>
+            <a:r>
+              <a:rPr lang="en-US" sz="1800" b="0" strike="noStrike" spc="-1">
+                <a:latin typeface="Arial"/>
+              </a:rPr>
+              <a:t>Fourth Outline Level</a:t>
+            </a:r>
+          </a:p>
+          <a:p>
+            <a:pPr marL="2160000" lvl="4" indent="-216000">
+              <a:spcBef>
+                <a:spcPts val="283"/>
+              </a:spcBef>
+              <a:buClr>
+                <a:srgbClr val="000000"/>
+              </a:buClr>
+              <a:buSzPct val="45000"/>
+              <a:buFont typeface="Wingdings" charset="2"/>
+              <a:buChar char=""/>
+            </a:pPr>
+            <a:r>
+              <a:rPr lang="en-US" sz="1800" b="0" strike="noStrike" spc="-1">
+                <a:latin typeface="Arial"/>
+              </a:rPr>
+              <a:t>Fifth Outline Level</a:t>
+            </a:r>
+          </a:p>
+          <a:p>
+            <a:pPr marL="2592000" lvl="5" indent="-216000">
+              <a:spcBef>
+                <a:spcPts val="283"/>
+              </a:spcBef>
+              <a:buClr>
+                <a:srgbClr val="000000"/>
+              </a:buClr>
+              <a:buSzPct val="45000"/>
+              <a:buFont typeface="Wingdings" charset="2"/>
+              <a:buChar char=""/>
+            </a:pPr>
+            <a:r>
+              <a:rPr lang="en-US" sz="1800" b="0" strike="noStrike" spc="-1">
+                <a:latin typeface="Arial"/>
+              </a:rPr>
+              <a:t>Sixth Outline Level</a:t>
+            </a:r>
+          </a:p>
+          <a:p>
+            <a:pPr marL="3024000" lvl="6" indent="-216000">
+              <a:spcBef>
+                <a:spcPts val="283"/>
+              </a:spcBef>
+              <a:buClr>
+                <a:srgbClr val="000000"/>
+              </a:buClr>
+              <a:buSzPct val="45000"/>
+              <a:buFont typeface="Wingdings" charset="2"/>
+              <a:buChar char=""/>
+            </a:pPr>
+            <a:r>
+              <a:rPr lang="en-US" sz="1800" b="0" strike="noStrike" spc="-1">
+                <a:latin typeface="Arial"/>
+              </a:rPr>
+              <a:t>Seventh Outline Level</a:t>
+            </a:r>
+          </a:p>
+        </p:txBody>
+      </p:sp>
+      <p:sp>
+        <p:nvSpPr>
+          <p:cNvPr id="2" name="PlaceHolder 3"/>
+          <p:cNvSpPr>
+            <a:spLocks noGrp="1"/>
+          </p:cNvSpPr>
+          <p:nvPr>
+            <p:ph type="ftr" idx="1"/>
+          </p:nvPr>
+        </p:nvSpPr>
+        <p:spPr>
+          <a:xfrm>
+            <a:off x="4038480" y="6356520"/>
+            <a:ext cx="4113720" cy="363960"/>
+          </a:xfrm>
+          <a:prstGeom prst="rect">
+            <a:avLst/>
+          </a:prstGeom>
+          <a:noFill/>
+          <a:ln w="0">
+            <a:noFill/>
+          </a:ln>
+        </p:spPr>
+        <p:txBody>
+          <a:bodyPr lIns="90000" tIns="45000" rIns="90000" bIns="45000" anchor="ctr">
             <a:noAutofit/>
           </a:bodyPr>
           <a:lstStyle>
@@ -2365,7 +2706,7 @@
                 <a:spcPct val="100000"/>
               </a:lnSpc>
               <a:buNone/>
-              <a:defRPr b="0" lang="en-US" sz="1400" spc="-1" strike="noStrike">
+              <a:defRPr lang="en-US" sz="1400" b="0" strike="noStrike" spc="-1">
                 <a:latin typeface="Times New Roman"/>
               </a:defRPr>
             </a:lvl1pPr>
@@ -2378,20 +2719,17 @@
               <a:buNone/>
             </a:pPr>
             <a:r>
-              <a:rPr b="0" lang="en-US" sz="1400" spc="-1" strike="noStrike">
+              <a:rPr lang="en-US" sz="1400" b="0" strike="noStrike" spc="-1">
                 <a:latin typeface="Times New Roman"/>
               </a:rPr>
               <a:t>&lt;footer&gt;</a:t>
             </a:r>
-            <a:endParaRPr b="0" lang="en-US" sz="1400" spc="-1" strike="noStrike">
-              <a:latin typeface="Times New Roman"/>
-            </a:endParaRPr>
-          </a:p>
-        </p:txBody>
-      </p:sp>
-      <p:sp>
-        <p:nvSpPr>
-          <p:cNvPr id="2" name="PlaceHolder 3"/>
+          </a:p>
+        </p:txBody>
+      </p:sp>
+      <p:sp>
+        <p:nvSpPr>
+          <p:cNvPr id="3" name="PlaceHolder 4"/>
           <p:cNvSpPr>
             <a:spLocks noGrp="1"/>
           </p:cNvSpPr>
@@ -2402,7 +2740,7 @@
         <p:spPr>
           <a:xfrm>
             <a:off x="8610480" y="6356520"/>
-            <a:ext cx="2742480" cy="364320"/>
+            <a:ext cx="2742120" cy="363960"/>
           </a:xfrm>
           <a:prstGeom prst="rect">
             <a:avLst/>
@@ -2413,7 +2751,7 @@
           </a:ln>
         </p:spPr>
         <p:txBody>
-          <a:bodyPr lIns="90000" rIns="90000" tIns="45000" bIns="45000" anchor="ctr">
+          <a:bodyPr lIns="90000" tIns="45000" rIns="90000" bIns="45000" anchor="ctr">
             <a:noAutofit/>
           </a:bodyPr>
           <a:lstStyle>
@@ -2422,9 +2760,9 @@
                 <a:spcPct val="100000"/>
               </a:lnSpc>
               <a:buNone/>
-              <a:defRPr b="0" lang="en-US" sz="1200" spc="-1" strike="noStrike">
+              <a:defRPr lang="en-US" sz="1200" b="0" strike="noStrike" spc="-1">
                 <a:solidFill>
-                  <a:srgbClr val="8b8b8b"/>
+                  <a:srgbClr val="8B8B8B"/>
                 </a:solidFill>
                 <a:latin typeface="Calibri"/>
               </a:defRPr>
@@ -2437,16 +2775,16 @@
               </a:lnSpc>
               <a:buNone/>
             </a:pPr>
-            <a:fld id="{E74B40C7-0128-4FD7-B54C-C99963F0C67C}" type="slidenum">
-              <a:rPr b="0" lang="en-US" sz="1200" spc="-1" strike="noStrike">
+            <a:fld id="{395239C5-BE26-4341-A88D-89FC402F6299}" type="slidenum">
+              <a:rPr lang="en-US" sz="1200" b="0" strike="noStrike" spc="-1">
                 <a:solidFill>
-                  <a:srgbClr val="8b8b8b"/>
+                  <a:srgbClr val="8B8B8B"/>
                 </a:solidFill>
                 <a:latin typeface="Calibri"/>
               </a:rPr>
-              <a:t>&lt;number&gt;</a:t>
+              <a:t>‹#›</a:t>
             </a:fld>
-            <a:endParaRPr b="0" lang="en-US" sz="1200" spc="-1" strike="noStrike">
+            <a:endParaRPr lang="en-US" sz="1200" b="0" strike="noStrike" spc="-1">
               <a:latin typeface="Times New Roman"/>
             </a:endParaRPr>
           </a:p>
@@ -2454,7 +2792,7 @@
       </p:sp>
       <p:sp>
         <p:nvSpPr>
-          <p:cNvPr id="3" name="PlaceHolder 4"/>
+          <p:cNvPr id="4" name="PlaceHolder 5"/>
           <p:cNvSpPr>
             <a:spLocks noGrp="1"/>
           </p:cNvSpPr>
@@ -2465,7 +2803,7 @@
         <p:spPr>
           <a:xfrm>
             <a:off x="838080" y="6356520"/>
-            <a:ext cx="2742480" cy="364320"/>
+            <a:ext cx="2742120" cy="363960"/>
           </a:xfrm>
           <a:prstGeom prst="rect">
             <a:avLst/>
@@ -2476,51 +2814,328 @@
           </a:ln>
         </p:spPr>
         <p:txBody>
-          <a:bodyPr lIns="90000" rIns="90000" tIns="45000" bIns="45000" anchor="ctr">
+          <a:bodyPr lIns="90000" tIns="45000" rIns="90000" bIns="45000" anchor="ctr">
             <a:noAutofit/>
           </a:bodyPr>
           <a:lstStyle>
             <a:lvl1pPr>
-              <a:defRPr b="0" lang="en-US" sz="1400" spc="-1" strike="noStrike">
+              <a:defRPr lang="en-US" sz="1400" b="0" strike="noStrike" spc="-1">
                 <a:latin typeface="Times New Roman"/>
               </a:defRPr>
             </a:lvl1pPr>
           </a:lstStyle>
           <a:p>
             <a:r>
-              <a:rPr b="0" lang="en-US" sz="1400" spc="-1" strike="noStrike">
+              <a:rPr lang="en-US" sz="1400" b="0" strike="noStrike" spc="-1">
                 <a:latin typeface="Times New Roman"/>
               </a:rPr>
               <a:t>&lt;date/time&gt;</a:t>
             </a:r>
-            <a:endParaRPr b="0" lang="en-US" sz="1400" spc="-1" strike="noStrike">
-              <a:latin typeface="Times New Roman"/>
-            </a:endParaRPr>
           </a:p>
         </p:txBody>
       </p:sp>
     </p:spTree>
   </p:cSld>
-  <p:clrMap bg1="lt1" bg2="lt2" tx1="dk1" tx2="dk2" accent1="accent1" accent2="accent2" accent3="accent3" accent4="accent4" accent5="accent5" accent6="accent6" hlink="hlink" folHlink="folHlink"/>
+  <p:clrMap bg1="lt1" tx1="dk1" bg2="lt2" tx2="dk2" accent1="accent1" accent2="accent2" accent3="accent3" accent4="accent4" accent5="accent5" accent6="accent6" hlink="hlink" folHlink="folHlink"/>
   <p:sldLayoutIdLst>
-    <p:sldLayoutId id="2147483649" r:id="rId2"/>
-    <p:sldLayoutId id="2147483650" r:id="rId3"/>
-    <p:sldLayoutId id="2147483651" r:id="rId4"/>
-    <p:sldLayoutId id="2147483652" r:id="rId5"/>
-    <p:sldLayoutId id="2147483653" r:id="rId6"/>
-    <p:sldLayoutId id="2147483654" r:id="rId7"/>
-    <p:sldLayoutId id="2147483655" r:id="rId8"/>
-    <p:sldLayoutId id="2147483656" r:id="rId9"/>
-    <p:sldLayoutId id="2147483657" r:id="rId10"/>
-    <p:sldLayoutId id="2147483658" r:id="rId11"/>
-    <p:sldLayoutId id="2147483659" r:id="rId12"/>
-    <p:sldLayoutId id="2147483660" r:id="rId13"/>
+    <p:sldLayoutId id="2147483649" r:id="rId1"/>
+    <p:sldLayoutId id="2147483650" r:id="rId2"/>
+    <p:sldLayoutId id="2147483651" r:id="rId3"/>
+    <p:sldLayoutId id="2147483652" r:id="rId4"/>
+    <p:sldLayoutId id="2147483653" r:id="rId5"/>
+    <p:sldLayoutId id="2147483654" r:id="rId6"/>
+    <p:sldLayoutId id="2147483655" r:id="rId7"/>
+    <p:sldLayoutId id="2147483656" r:id="rId8"/>
+    <p:sldLayoutId id="2147483657" r:id="rId9"/>
+    <p:sldLayoutId id="2147483658" r:id="rId10"/>
+    <p:sldLayoutId id="2147483659" r:id="rId11"/>
+    <p:sldLayoutId id="2147483660" r:id="rId12"/>
   </p:sldLayoutIdLst>
+  <p:txStyles>
+    <p:titleStyle>
+      <a:lvl1pPr algn="l" defTabSz="914400" rtl="0" eaLnBrk="1" latinLnBrk="0" hangingPunct="1">
+        <a:lnSpc>
+          <a:spcPct val="90000"/>
+        </a:lnSpc>
+        <a:spcBef>
+          <a:spcPct val="0"/>
+        </a:spcBef>
+        <a:buNone/>
+        <a:defRPr sz="4400" kern="1200">
+          <a:solidFill>
+            <a:schemeClr val="tx1"/>
+          </a:solidFill>
+          <a:latin typeface="+mj-lt"/>
+          <a:ea typeface="+mj-ea"/>
+          <a:cs typeface="+mj-cs"/>
+        </a:defRPr>
+      </a:lvl1pPr>
+    </p:titleStyle>
+    <p:bodyStyle>
+      <a:lvl1pPr marL="228600" indent="-228600" algn="l" defTabSz="914400" rtl="0" eaLnBrk="1" latinLnBrk="0" hangingPunct="1">
+        <a:lnSpc>
+          <a:spcPct val="90000"/>
+        </a:lnSpc>
+        <a:spcBef>
+          <a:spcPts val="1000"/>
+        </a:spcBef>
+        <a:buFont typeface="Arial" panose="020B0604020202020204" pitchFamily="34" charset="0"/>
+        <a:buChar char="•"/>
+        <a:defRPr sz="2800" kern="1200">
+          <a:solidFill>
+            <a:schemeClr val="tx1"/>
+          </a:solidFill>
+          <a:latin typeface="+mn-lt"/>
+          <a:ea typeface="+mn-ea"/>
+          <a:cs typeface="+mn-cs"/>
+        </a:defRPr>
+      </a:lvl1pPr>
+      <a:lvl2pPr marL="685800" indent="-228600" algn="l" defTabSz="914400" rtl="0" eaLnBrk="1" latinLnBrk="0" hangingPunct="1">
+        <a:lnSpc>
+          <a:spcPct val="90000"/>
+        </a:lnSpc>
+        <a:spcBef>
+          <a:spcPts val="500"/>
+        </a:spcBef>
+        <a:buFont typeface="Arial" panose="020B0604020202020204" pitchFamily="34" charset="0"/>
+        <a:buChar char="•"/>
+        <a:defRPr sz="2400" kern="1200">
+          <a:solidFill>
+            <a:schemeClr val="tx1"/>
+          </a:solidFill>
+          <a:latin typeface="+mn-lt"/>
+          <a:ea typeface="+mn-ea"/>
+          <a:cs typeface="+mn-cs"/>
+        </a:defRPr>
+      </a:lvl2pPr>
+      <a:lvl3pPr marL="1143000" indent="-228600" algn="l" defTabSz="914400" rtl="0" eaLnBrk="1" latinLnBrk="0" hangingPunct="1">
+        <a:lnSpc>
+          <a:spcPct val="90000"/>
+        </a:lnSpc>
+        <a:spcBef>
+          <a:spcPts val="500"/>
+        </a:spcBef>
+        <a:buFont typeface="Arial" panose="020B0604020202020204" pitchFamily="34" charset="0"/>
+        <a:buChar char="•"/>
+        <a:defRPr sz="2000" kern="1200">
+          <a:solidFill>
+            <a:schemeClr val="tx1"/>
+          </a:solidFill>
+          <a:latin typeface="+mn-lt"/>
+          <a:ea typeface="+mn-ea"/>
+          <a:cs typeface="+mn-cs"/>
+        </a:defRPr>
+      </a:lvl3pPr>
+      <a:lvl4pPr marL="1600200" indent="-228600" algn="l" defTabSz="914400" rtl="0" eaLnBrk="1" latinLnBrk="0" hangingPunct="1">
+        <a:lnSpc>
+          <a:spcPct val="90000"/>
+        </a:lnSpc>
+        <a:spcBef>
+          <a:spcPts val="500"/>
+        </a:spcBef>
+        <a:buFont typeface="Arial" panose="020B0604020202020204" pitchFamily="34" charset="0"/>
+        <a:buChar char="•"/>
+        <a:defRPr sz="1800" kern="1200">
+          <a:solidFill>
+            <a:schemeClr val="tx1"/>
+          </a:solidFill>
+          <a:latin typeface="+mn-lt"/>
+          <a:ea typeface="+mn-ea"/>
+          <a:cs typeface="+mn-cs"/>
+        </a:defRPr>
+      </a:lvl4pPr>
+      <a:lvl5pPr marL="2057400" indent="-228600" algn="l" defTabSz="914400" rtl="0" eaLnBrk="1" latinLnBrk="0" hangingPunct="1">
+        <a:lnSpc>
+          <a:spcPct val="90000"/>
+        </a:lnSpc>
+        <a:spcBef>
+          <a:spcPts val="500"/>
+        </a:spcBef>
+        <a:buFont typeface="Arial" panose="020B0604020202020204" pitchFamily="34" charset="0"/>
+        <a:buChar char="•"/>
+        <a:defRPr sz="1800" kern="1200">
+          <a:solidFill>
+            <a:schemeClr val="tx1"/>
+          </a:solidFill>
+          <a:latin typeface="+mn-lt"/>
+          <a:ea typeface="+mn-ea"/>
+          <a:cs typeface="+mn-cs"/>
+        </a:defRPr>
+      </a:lvl5pPr>
+      <a:lvl6pPr marL="2514600" indent="-228600" algn="l" defTabSz="914400" rtl="0" eaLnBrk="1" latinLnBrk="0" hangingPunct="1">
+        <a:lnSpc>
+          <a:spcPct val="90000"/>
+        </a:lnSpc>
+        <a:spcBef>
+          <a:spcPts val="500"/>
+        </a:spcBef>
+        <a:buFont typeface="Arial" panose="020B0604020202020204" pitchFamily="34" charset="0"/>
+        <a:buChar char="•"/>
+        <a:defRPr sz="1800" kern="1200">
+          <a:solidFill>
+            <a:schemeClr val="tx1"/>
+          </a:solidFill>
+          <a:latin typeface="+mn-lt"/>
+          <a:ea typeface="+mn-ea"/>
+          <a:cs typeface="+mn-cs"/>
+        </a:defRPr>
+      </a:lvl6pPr>
+      <a:lvl7pPr marL="2971800" indent="-228600" algn="l" defTabSz="914400" rtl="0" eaLnBrk="1" latinLnBrk="0" hangingPunct="1">
+        <a:lnSpc>
+          <a:spcPct val="90000"/>
+        </a:lnSpc>
+        <a:spcBef>
+          <a:spcPts val="500"/>
+        </a:spcBef>
+        <a:buFont typeface="Arial" panose="020B0604020202020204" pitchFamily="34" charset="0"/>
+        <a:buChar char="•"/>
+        <a:defRPr sz="1800" kern="1200">
+          <a:solidFill>
+            <a:schemeClr val="tx1"/>
+          </a:solidFill>
+          <a:latin typeface="+mn-lt"/>
+          <a:ea typeface="+mn-ea"/>
+          <a:cs typeface="+mn-cs"/>
+        </a:defRPr>
+      </a:lvl7pPr>
+      <a:lvl8pPr marL="3429000" indent="-228600" algn="l" defTabSz="914400" rtl="0" eaLnBrk="1" latinLnBrk="0" hangingPunct="1">
+        <a:lnSpc>
+          <a:spcPct val="90000"/>
+        </a:lnSpc>
+        <a:spcBef>
+          <a:spcPts val="500"/>
+        </a:spcBef>
+        <a:buFont typeface="Arial" panose="020B0604020202020204" pitchFamily="34" charset="0"/>
+        <a:buChar char="•"/>
+        <a:defRPr sz="1800" kern="1200">
+          <a:solidFill>
+            <a:schemeClr val="tx1"/>
+          </a:solidFill>
+          <a:latin typeface="+mn-lt"/>
+          <a:ea typeface="+mn-ea"/>
+          <a:cs typeface="+mn-cs"/>
+        </a:defRPr>
+      </a:lvl8pPr>
+      <a:lvl9pPr marL="3886200" indent="-228600" algn="l" defTabSz="914400" rtl="0" eaLnBrk="1" latinLnBrk="0" hangingPunct="1">
+        <a:lnSpc>
+          <a:spcPct val="90000"/>
+        </a:lnSpc>
+        <a:spcBef>
+          <a:spcPts val="500"/>
+        </a:spcBef>
+        <a:buFont typeface="Arial" panose="020B0604020202020204" pitchFamily="34" charset="0"/>
+        <a:buChar char="•"/>
+        <a:defRPr sz="1800" kern="1200">
+          <a:solidFill>
+            <a:schemeClr val="tx1"/>
+          </a:solidFill>
+          <a:latin typeface="+mn-lt"/>
+          <a:ea typeface="+mn-ea"/>
+          <a:cs typeface="+mn-cs"/>
+        </a:defRPr>
+      </a:lvl9pPr>
+    </p:bodyStyle>
+    <p:otherStyle>
+      <a:defPPr>
+        <a:defRPr lang="en-US"/>
+      </a:defPPr>
+      <a:lvl1pPr marL="0" algn="l" defTabSz="914400" rtl="0" eaLnBrk="1" latinLnBrk="0" hangingPunct="1">
+        <a:defRPr sz="1800" kern="1200">
+          <a:solidFill>
+            <a:schemeClr val="tx1"/>
+          </a:solidFill>
+          <a:latin typeface="+mn-lt"/>
+          <a:ea typeface="+mn-ea"/>
+          <a:cs typeface="+mn-cs"/>
+        </a:defRPr>
+      </a:lvl1pPr>
+      <a:lvl2pPr marL="457200" algn="l" defTabSz="914400" rtl="0" eaLnBrk="1" latinLnBrk="0" hangingPunct="1">
+        <a:defRPr sz="1800" kern="1200">
+          <a:solidFill>
+            <a:schemeClr val="tx1"/>
+          </a:solidFill>
+          <a:latin typeface="+mn-lt"/>
+          <a:ea typeface="+mn-ea"/>
+          <a:cs typeface="+mn-cs"/>
+        </a:defRPr>
+      </a:lvl2pPr>
+      <a:lvl3pPr marL="914400" algn="l" defTabSz="914400" rtl="0" eaLnBrk="1" latinLnBrk="0" hangingPunct="1">
+        <a:defRPr sz="1800" kern="1200">
+          <a:solidFill>
+            <a:schemeClr val="tx1"/>
+          </a:solidFill>
+          <a:latin typeface="+mn-lt"/>
+          <a:ea typeface="+mn-ea"/>
+          <a:cs typeface="+mn-cs"/>
+        </a:defRPr>
+      </a:lvl3pPr>
+      <a:lvl4pPr marL="1371600" algn="l" defTabSz="914400" rtl="0" eaLnBrk="1" latinLnBrk="0" hangingPunct="1">
+        <a:defRPr sz="1800" kern="1200">
+          <a:solidFill>
+            <a:schemeClr val="tx1"/>
+          </a:solidFill>
+          <a:latin typeface="+mn-lt"/>
+          <a:ea typeface="+mn-ea"/>
+          <a:cs typeface="+mn-cs"/>
+        </a:defRPr>
+      </a:lvl4pPr>
+      <a:lvl5pPr marL="1828800" algn="l" defTabSz="914400" rtl="0" eaLnBrk="1" latinLnBrk="0" hangingPunct="1">
+        <a:defRPr sz="1800" kern="1200">
+          <a:solidFill>
+            <a:schemeClr val="tx1"/>
+          </a:solidFill>
+          <a:latin typeface="+mn-lt"/>
+          <a:ea typeface="+mn-ea"/>
+          <a:cs typeface="+mn-cs"/>
+        </a:defRPr>
+      </a:lvl5pPr>
+      <a:lvl6pPr marL="2286000" algn="l" defTabSz="914400" rtl="0" eaLnBrk="1" latinLnBrk="0" hangingPunct="1">
+        <a:defRPr sz="1800" kern="1200">
+          <a:solidFill>
+            <a:schemeClr val="tx1"/>
+          </a:solidFill>
+          <a:latin typeface="+mn-lt"/>
+          <a:ea typeface="+mn-ea"/>
+          <a:cs typeface="+mn-cs"/>
+        </a:defRPr>
+      </a:lvl6pPr>
+      <a:lvl7pPr marL="2743200" algn="l" defTabSz="914400" rtl="0" eaLnBrk="1" latinLnBrk="0" hangingPunct="1">
+        <a:defRPr sz="1800" kern="1200">
+          <a:solidFill>
+            <a:schemeClr val="tx1"/>
+          </a:solidFill>
+          <a:latin typeface="+mn-lt"/>
+          <a:ea typeface="+mn-ea"/>
+          <a:cs typeface="+mn-cs"/>
+        </a:defRPr>
+      </a:lvl7pPr>
+      <a:lvl8pPr marL="3200400" algn="l" defTabSz="914400" rtl="0" eaLnBrk="1" latinLnBrk="0" hangingPunct="1">
+        <a:defRPr sz="1800" kern="1200">
+          <a:solidFill>
+            <a:schemeClr val="tx1"/>
+          </a:solidFill>
+          <a:latin typeface="+mn-lt"/>
+          <a:ea typeface="+mn-ea"/>
+          <a:cs typeface="+mn-cs"/>
+        </a:defRPr>
+      </a:lvl8pPr>
+      <a:lvl9pPr marL="3657600" algn="l" defTabSz="914400" rtl="0" eaLnBrk="1" latinLnBrk="0" hangingPunct="1">
+        <a:defRPr sz="1800" kern="1200">
+          <a:solidFill>
+            <a:schemeClr val="tx1"/>
+          </a:solidFill>
+          <a:latin typeface="+mn-lt"/>
+          <a:ea typeface="+mn-ea"/>
+          <a:cs typeface="+mn-cs"/>
+        </a:defRPr>
+      </a:lvl9pPr>
+    </p:otherStyle>
+  </p:txStyles>
 </p:sldMaster>
 </file>
 
 <file path=ppt/slides/slide1.xml><?xml version="1.0" encoding="utf-8"?>
-<p:sld xmlns:a="http://schemas.openxmlformats.org/drawingml/2006/main" xmlns:p="http://schemas.openxmlformats.org/presentationml/2006/main" xmlns:r="http://schemas.openxmlformats.org/officeDocument/2006/relationships" xmlns:p14="http://schemas.microsoft.com/office/powerpoint/2010/main" xmlns:p15="http://schemas.microsoft.com/office/powerpoint/2012/main" xmlns:mc="http://schemas.openxmlformats.org/markup-compatibility/2006">
+<p:sld xmlns:a="http://schemas.openxmlformats.org/drawingml/2006/main" xmlns:r="http://schemas.openxmlformats.org/officeDocument/2006/relationships" xmlns:p="http://schemas.openxmlformats.org/presentationml/2006/main">
   <p:cSld>
     <p:spTree>
       <p:nvGrpSpPr>
@@ -2536,34 +3151,105 @@
           <a:chExt cx="0" cy="0"/>
         </a:xfrm>
       </p:grpSpPr>
+      <p:sp>
+        <p:nvSpPr>
+          <p:cNvPr id="45" name="Rectangle 8"/>
+          <p:cNvSpPr/>
+          <p:nvPr/>
+        </p:nvSpPr>
+        <p:spPr>
+          <a:xfrm>
+            <a:off x="153720" y="1937520"/>
+            <a:ext cx="1576080" cy="301680"/>
+          </a:xfrm>
+          <a:prstGeom prst="rect">
+            <a:avLst/>
+          </a:prstGeom>
+          <a:noFill/>
+          <a:ln>
+            <a:solidFill>
+              <a:srgbClr val="2F5597"/>
+            </a:solidFill>
+          </a:ln>
+        </p:spPr>
+        <p:style>
+          <a:lnRef idx="2">
+            <a:schemeClr val="accent1">
+              <a:shade val="50000"/>
+            </a:schemeClr>
+          </a:lnRef>
+          <a:fillRef idx="1">
+            <a:schemeClr val="accent1"/>
+          </a:fillRef>
+          <a:effectRef idx="0">
+            <a:schemeClr val="accent1"/>
+          </a:effectRef>
+          <a:fontRef idx="minor"/>
+        </p:style>
+        <p:txBody>
+          <a:bodyPr lIns="90000" tIns="45000" rIns="90000" bIns="45000" anchor="ctr">
+            <a:noAutofit/>
+          </a:bodyPr>
+          <a:lstStyle/>
+          <a:p>
+            <a:pPr algn="ctr">
+              <a:lnSpc>
+                <a:spcPct val="100000"/>
+              </a:lnSpc>
+              <a:buNone/>
+            </a:pPr>
+            <a:r>
+              <a:rPr lang="en-US" sz="1800" b="0" strike="noStrike" spc="-1">
+                <a:solidFill>
+                  <a:srgbClr val="000000"/>
+                </a:solidFill>
+                <a:latin typeface="Times New Roman"/>
+                <a:ea typeface="DejaVu Sans"/>
+              </a:rPr>
+              <a:t>Visual prompt</a:t>
+            </a:r>
+            <a:endParaRPr lang="en-US" sz="1800" b="0" strike="noStrike" spc="-1">
+              <a:latin typeface="Arial"/>
+            </a:endParaRPr>
+          </a:p>
+        </p:txBody>
+      </p:sp>
       <p:grpSp>
         <p:nvGrpSpPr>
-          <p:cNvPr id="40" name="Group 47"/>
-          <p:cNvGrpSpPr/>
+          <p:cNvPr id="39" name="Group 38">
+            <a:extLst>
+              <a:ext uri="{FF2B5EF4-FFF2-40B4-BE49-F238E27FC236}">
+                <a16:creationId xmlns:a16="http://schemas.microsoft.com/office/drawing/2014/main" id="{34C288AE-57AD-46BB-9F09-1EB644B02648}"/>
+              </a:ext>
+            </a:extLst>
+          </p:cNvPr>
+          <p:cNvGrpSpPr>
+            <a:grpSpLocks noChangeAspect="1"/>
+          </p:cNvGrpSpPr>
           <p:nvPr/>
         </p:nvGrpSpPr>
         <p:grpSpPr>
           <a:xfrm>
-            <a:off x="153720" y="1937520"/>
-            <a:ext cx="11883600" cy="2510280"/>
-            <a:chOff x="153720" y="1937520"/>
-            <a:chExt cx="11883600" cy="2510280"/>
+            <a:off x="299520" y="699730"/>
+            <a:ext cx="11687702" cy="5732520"/>
+            <a:chOff x="299520" y="699730"/>
+            <a:chExt cx="11687702" cy="5732520"/>
           </a:xfrm>
         </p:grpSpPr>
         <p:pic>
           <p:nvPicPr>
-            <p:cNvPr id="41" name="Picture 4" descr=""/>
+            <p:cNvPr id="42" name="Picture 4"/>
             <p:cNvPicPr/>
             <p:nvPr/>
           </p:nvPicPr>
           <p:blipFill>
-            <a:blip r:embed="rId1"/>
+            <a:blip r:embed="rId2"/>
             <a:stretch/>
           </p:blipFill>
           <p:spPr>
             <a:xfrm>
               <a:off x="299520" y="2413440"/>
-              <a:ext cx="798480" cy="951120"/>
+              <a:ext cx="798120" cy="950760"/>
             </a:xfrm>
             <a:prstGeom prst="rect">
               <a:avLst/>
@@ -2575,18 +3261,18 @@
         </p:pic>
         <p:pic>
           <p:nvPicPr>
-            <p:cNvPr id="42" name="Picture 6" descr=""/>
+            <p:cNvPr id="43" name="Picture 6"/>
             <p:cNvPicPr/>
             <p:nvPr/>
           </p:nvPicPr>
           <p:blipFill>
-            <a:blip r:embed="rId2"/>
+            <a:blip r:embed="rId3"/>
             <a:stretch/>
           </p:blipFill>
           <p:spPr>
             <a:xfrm>
-              <a:off x="10275840" y="2295720"/>
-              <a:ext cx="1761480" cy="2152080"/>
+              <a:off x="10226102" y="4280530"/>
+              <a:ext cx="1761120" cy="2151720"/>
             </a:xfrm>
             <a:prstGeom prst="rect">
               <a:avLst/>
@@ -2598,14 +3284,14 @@
         </p:pic>
         <p:sp>
           <p:nvSpPr>
-            <p:cNvPr id="43" name="Rectangle 7"/>
+            <p:cNvPr id="44" name="Rectangle 7"/>
             <p:cNvSpPr/>
             <p:nvPr/>
           </p:nvSpPr>
           <p:spPr>
             <a:xfrm>
               <a:off x="1731240" y="2529000"/>
-              <a:ext cx="1682640" cy="720360"/>
+              <a:ext cx="1682280" cy="720000"/>
             </a:xfrm>
             <a:prstGeom prst="rect">
               <a:avLst/>
@@ -2613,7 +3299,7 @@
             <a:noFill/>
             <a:ln>
               <a:solidFill>
-                <a:srgbClr val="2f5597"/>
+                <a:srgbClr val="2F5597"/>
               </a:solidFill>
             </a:ln>
           </p:spPr>
@@ -2632,9 +3318,10 @@
             <a:fontRef idx="minor"/>
           </p:style>
           <p:txBody>
-            <a:bodyPr lIns="90000" rIns="90000" tIns="45000" bIns="45000" anchor="ctr">
+            <a:bodyPr lIns="90000" tIns="45000" rIns="90000" bIns="45000" anchor="ctr">
               <a:noAutofit/>
             </a:bodyPr>
+            <a:lstStyle/>
             <a:p>
               <a:pPr algn="ctr">
                 <a:lnSpc>
@@ -2643,16 +3330,16 @@
                 <a:buNone/>
               </a:pPr>
               <a:r>
-                <a:rPr b="0" lang="en-US" sz="1800" spc="-1" strike="noStrike">
+                <a:rPr lang="en-US" sz="1800" b="0" strike="noStrike" spc="-1" dirty="0">
                   <a:solidFill>
                     <a:srgbClr val="000000"/>
                   </a:solidFill>
                   <a:latin typeface="Times New Roman"/>
                   <a:ea typeface="DejaVu Sans"/>
                 </a:rPr>
-                <a:t>Vision-language model</a:t>
+                <a:t>Seeing Anything</a:t>
               </a:r>
-              <a:endParaRPr b="0" lang="en-US" sz="1800" spc="-1" strike="noStrike">
+              <a:endParaRPr lang="en-US" sz="1800" b="0" strike="noStrike" spc="-1" dirty="0">
                 <a:latin typeface="Arial"/>
               </a:endParaRPr>
             </a:p>
@@ -2660,14 +3347,49 @@
         </p:sp>
         <p:sp>
           <p:nvSpPr>
-            <p:cNvPr id="44" name="Rectangle 8"/>
+            <p:cNvPr id="46" name="Connector: Elbow 10"/>
             <p:cNvSpPr/>
             <p:nvPr/>
           </p:nvSpPr>
           <p:spPr>
             <a:xfrm>
-              <a:off x="153720" y="1937520"/>
-              <a:ext cx="1576440" cy="302040"/>
+              <a:off x="1731240" y="2089080"/>
+              <a:ext cx="840600" cy="438840"/>
+            </a:xfrm>
+            <a:prstGeom prst="bentConnector2">
+              <a:avLst/>
+            </a:prstGeom>
+            <a:noFill/>
+            <a:ln>
+              <a:solidFill>
+                <a:srgbClr val="000000"/>
+              </a:solidFill>
+              <a:tailEnd type="triangle" w="med" len="med"/>
+            </a:ln>
+          </p:spPr>
+          <p:style>
+            <a:lnRef idx="1">
+              <a:schemeClr val="accent1"/>
+            </a:lnRef>
+            <a:fillRef idx="0">
+              <a:schemeClr val="accent1"/>
+            </a:fillRef>
+            <a:effectRef idx="0">
+              <a:schemeClr val="accent1"/>
+            </a:effectRef>
+            <a:fontRef idx="minor"/>
+          </p:style>
+        </p:sp>
+        <p:sp>
+          <p:nvSpPr>
+            <p:cNvPr id="47" name="Rectangle 11"/>
+            <p:cNvSpPr/>
+            <p:nvPr/>
+          </p:nvSpPr>
+          <p:spPr>
+            <a:xfrm>
+              <a:off x="1731240" y="3494880"/>
+              <a:ext cx="1682280" cy="720000"/>
             </a:xfrm>
             <a:prstGeom prst="rect">
               <a:avLst/>
@@ -2675,7 +3397,7 @@
             <a:noFill/>
             <a:ln>
               <a:solidFill>
-                <a:srgbClr val="2f5597"/>
+                <a:srgbClr val="2F5597"/>
               </a:solidFill>
             </a:ln>
           </p:spPr>
@@ -2694,9 +3416,10 @@
             <a:fontRef idx="minor"/>
           </p:style>
           <p:txBody>
-            <a:bodyPr lIns="90000" rIns="90000" tIns="45000" bIns="45000" anchor="ctr">
+            <a:bodyPr lIns="90000" tIns="45000" rIns="90000" bIns="45000" anchor="ctr">
               <a:noAutofit/>
             </a:bodyPr>
+            <a:lstStyle/>
             <a:p>
               <a:pPr algn="ctr">
                 <a:lnSpc>
@@ -2705,16 +3428,16 @@
                 <a:buNone/>
               </a:pPr>
               <a:r>
-                <a:rPr b="0" lang="en-US" sz="1800" spc="-1" strike="noStrike">
+                <a:rPr lang="en-US" sz="1800" b="0" strike="noStrike" spc="-1" dirty="0">
                   <a:solidFill>
                     <a:srgbClr val="000000"/>
                   </a:solidFill>
                   <a:latin typeface="Times New Roman"/>
                   <a:ea typeface="DejaVu Sans"/>
                 </a:rPr>
-                <a:t>Visual prompt</a:t>
+                <a:t>Depth Anything</a:t>
               </a:r>
-              <a:endParaRPr b="0" lang="en-US" sz="1800" spc="-1" strike="noStrike">
+              <a:endParaRPr lang="en-US" sz="1800" b="0" strike="noStrike" spc="-1" dirty="0">
                 <a:latin typeface="Arial"/>
               </a:endParaRPr>
             </a:p>
@@ -2722,24 +3445,26 @@
         </p:sp>
         <p:sp>
           <p:nvSpPr>
-            <p:cNvPr id="45" name="Connector: Elbow 10"/>
+            <p:cNvPr id="48" name="Connector: Elbow 12"/>
             <p:cNvSpPr/>
             <p:nvPr/>
           </p:nvSpPr>
           <p:spPr>
             <a:xfrm>
-              <a:off x="1731240" y="2089080"/>
-              <a:ext cx="840960" cy="439200"/>
+              <a:off x="1098360" y="2889360"/>
+              <a:ext cx="631440" cy="964800"/>
             </a:xfrm>
-            <a:prstGeom prst="bentConnector2">
-              <a:avLst/>
+            <a:prstGeom prst="bentConnector3">
+              <a:avLst>
+                <a:gd name="adj1" fmla="val 50000"/>
+              </a:avLst>
             </a:prstGeom>
             <a:noFill/>
             <a:ln>
               <a:solidFill>
                 <a:srgbClr val="000000"/>
               </a:solidFill>
-              <a:tailEnd len="med" type="triangle" w="med"/>
+              <a:tailEnd type="triangle" w="med" len="med"/>
             </a:ln>
           </p:spPr>
           <p:style>
@@ -2757,118 +3482,20 @@
         </p:sp>
         <p:sp>
           <p:nvSpPr>
-            <p:cNvPr id="46" name="Rectangle 11"/>
-            <p:cNvSpPr/>
-            <p:nvPr/>
-          </p:nvSpPr>
-          <p:spPr>
-            <a:xfrm>
-              <a:off x="1731240" y="3494880"/>
-              <a:ext cx="1682640" cy="720360"/>
-            </a:xfrm>
-            <a:prstGeom prst="rect">
-              <a:avLst/>
-            </a:prstGeom>
-            <a:noFill/>
-            <a:ln>
-              <a:solidFill>
-                <a:srgbClr val="2f5597"/>
-              </a:solidFill>
-            </a:ln>
-          </p:spPr>
-          <p:style>
-            <a:lnRef idx="2">
-              <a:schemeClr val="accent1">
-                <a:shade val="50000"/>
-              </a:schemeClr>
-            </a:lnRef>
-            <a:fillRef idx="1">
-              <a:schemeClr val="accent1"/>
-            </a:fillRef>
-            <a:effectRef idx="0">
-              <a:schemeClr val="accent1"/>
-            </a:effectRef>
-            <a:fontRef idx="minor"/>
-          </p:style>
-          <p:txBody>
-            <a:bodyPr lIns="90000" rIns="90000" tIns="45000" bIns="45000" anchor="ctr">
-              <a:noAutofit/>
-            </a:bodyPr>
-            <a:p>
-              <a:pPr algn="ctr">
-                <a:lnSpc>
-                  <a:spcPct val="100000"/>
-                </a:lnSpc>
-                <a:buNone/>
-              </a:pPr>
-              <a:r>
-                <a:rPr b="0" lang="en-US" sz="1800" spc="-1" strike="noStrike">
-                  <a:solidFill>
-                    <a:srgbClr val="000000"/>
-                  </a:solidFill>
-                  <a:latin typeface="Times New Roman"/>
-                  <a:ea typeface="DejaVu Sans"/>
-                </a:rPr>
-                <a:t>Depth Any thing</a:t>
-              </a:r>
-              <a:endParaRPr b="0" lang="en-US" sz="1800" spc="-1" strike="noStrike">
-                <a:latin typeface="Arial"/>
-              </a:endParaRPr>
-            </a:p>
-          </p:txBody>
-        </p:sp>
-        <p:sp>
-          <p:nvSpPr>
-            <p:cNvPr id="47" name="Connector: Elbow 12"/>
+            <p:cNvPr id="49" name="Straight Arrow Connector 19"/>
             <p:cNvSpPr/>
             <p:nvPr/>
           </p:nvSpPr>
           <p:spPr>
             <a:xfrm>
               <a:off x="1098360" y="2889360"/>
-              <a:ext cx="631800" cy="965160"/>
-            </a:xfrm>
-            <a:prstGeom prst="bentConnector3">
-              <a:avLst>
-                <a:gd name="adj1" fmla="val 50000"/>
-              </a:avLst>
-            </a:prstGeom>
-            <a:noFill/>
-            <a:ln>
-              <a:solidFill>
-                <a:srgbClr val="000000"/>
-              </a:solidFill>
-              <a:tailEnd len="med" type="triangle" w="med"/>
-            </a:ln>
-          </p:spPr>
-          <p:style>
-            <a:lnRef idx="1">
-              <a:schemeClr val="accent1"/>
-            </a:lnRef>
-            <a:fillRef idx="0">
-              <a:schemeClr val="accent1"/>
-            </a:fillRef>
-            <a:effectRef idx="0">
-              <a:schemeClr val="accent1"/>
-            </a:effectRef>
-            <a:fontRef idx="minor"/>
-          </p:style>
-        </p:sp>
-        <p:sp>
-          <p:nvSpPr>
-            <p:cNvPr id="48" name="Straight Arrow Connector 19"/>
-            <p:cNvSpPr/>
-            <p:nvPr/>
-          </p:nvSpPr>
-          <p:spPr>
-            <a:xfrm>
-              <a:off x="1098360" y="2889360"/>
-              <a:ext cx="631800" cy="360"/>
+              <a:ext cx="631440" cy="360"/>
             </a:xfrm>
             <a:custGeom>
               <a:avLst/>
               <a:gdLst/>
               <a:ahLst/>
+              <a:cxnLst/>
               <a:rect l="l" t="t" r="r" b="b"/>
               <a:pathLst>
                 <a:path w="21600" h="21600">
@@ -2886,7 +3513,7 @@
               <a:solidFill>
                 <a:srgbClr val="000000"/>
               </a:solidFill>
-              <a:tailEnd len="med" type="triangle" w="med"/>
+              <a:tailEnd type="triangle" w="med" len="med"/>
             </a:ln>
           </p:spPr>
           <p:style>
@@ -2904,14 +3531,14 @@
         </p:sp>
         <p:sp>
           <p:nvSpPr>
-            <p:cNvPr id="49" name="Rectangle 20"/>
+            <p:cNvPr id="50" name="Rectangle 20"/>
             <p:cNvSpPr/>
             <p:nvPr/>
           </p:nvSpPr>
           <p:spPr>
             <a:xfrm>
               <a:off x="3835080" y="2537640"/>
-              <a:ext cx="960120" cy="1686240"/>
+              <a:ext cx="959760" cy="1685880"/>
             </a:xfrm>
             <a:prstGeom prst="rect">
               <a:avLst/>
@@ -2919,7 +3546,7 @@
             <a:noFill/>
             <a:ln>
               <a:solidFill>
-                <a:srgbClr val="2f5597"/>
+                <a:srgbClr val="2F5597"/>
               </a:solidFill>
             </a:ln>
           </p:spPr>
@@ -2938,9 +3565,10 @@
             <a:fontRef idx="minor"/>
           </p:style>
           <p:txBody>
-            <a:bodyPr lIns="90000" rIns="90000" tIns="45000" bIns="45000" anchor="ctr">
+            <a:bodyPr lIns="90000" tIns="45000" rIns="90000" bIns="45000" anchor="ctr">
               <a:noAutofit/>
             </a:bodyPr>
+            <a:lstStyle/>
             <a:p>
               <a:pPr algn="ctr">
                 <a:lnSpc>
@@ -2949,7 +3577,7 @@
                 <a:buNone/>
               </a:pPr>
               <a:r>
-                <a:rPr b="0" lang="en-US" sz="1800" spc="-1" strike="noStrike">
+                <a:rPr lang="en-US" sz="1800" b="0" strike="noStrike" spc="-1">
                   <a:solidFill>
                     <a:srgbClr val="000000"/>
                   </a:solidFill>
@@ -2958,7 +3586,7 @@
                 </a:rPr>
                 <a:t>ROI Fusion</a:t>
               </a:r>
-              <a:endParaRPr b="0" lang="en-US" sz="1800" spc="-1" strike="noStrike">
+              <a:endParaRPr lang="en-US" sz="1800" b="0" strike="noStrike" spc="-1">
                 <a:latin typeface="Arial"/>
               </a:endParaRPr>
             </a:p>
@@ -2966,14 +3594,14 @@
         </p:sp>
         <p:sp>
           <p:nvSpPr>
-            <p:cNvPr id="50" name="Connector: Elbow 22"/>
+            <p:cNvPr id="51" name="Connector: Elbow 22"/>
             <p:cNvSpPr/>
             <p:nvPr/>
           </p:nvSpPr>
           <p:spPr>
             <a:xfrm>
               <a:off x="3414240" y="2889360"/>
-              <a:ext cx="420120" cy="491040"/>
+              <a:ext cx="419760" cy="490680"/>
             </a:xfrm>
             <a:prstGeom prst="bentConnector3">
               <a:avLst>
@@ -2985,7 +3613,7 @@
               <a:solidFill>
                 <a:srgbClr val="000000"/>
               </a:solidFill>
-              <a:tailEnd len="med" type="triangle" w="med"/>
+              <a:tailEnd type="triangle" w="med" len="med"/>
             </a:ln>
           </p:spPr>
           <p:style>
@@ -3003,14 +3631,14 @@
         </p:sp>
         <p:sp>
           <p:nvSpPr>
-            <p:cNvPr id="51" name="Connector: Elbow 24"/>
+            <p:cNvPr id="52" name="Connector: Elbow 24"/>
             <p:cNvSpPr/>
             <p:nvPr/>
           </p:nvSpPr>
           <p:spPr>
             <a:xfrm flipV="1">
               <a:off x="3414240" y="3380400"/>
-              <a:ext cx="420120" cy="473400"/>
+              <a:ext cx="419760" cy="473040"/>
             </a:xfrm>
             <a:prstGeom prst="bentConnector3">
               <a:avLst>
@@ -3022,7 +3650,7 @@
               <a:solidFill>
                 <a:srgbClr val="000000"/>
               </a:solidFill>
-              <a:tailEnd len="med" type="triangle" w="med"/>
+              <a:tailEnd type="triangle" w="med" len="med"/>
             </a:ln>
           </p:spPr>
           <p:style>
@@ -3040,14 +3668,14 @@
         </p:sp>
         <p:sp>
           <p:nvSpPr>
-            <p:cNvPr id="52" name="Rectangle 27"/>
+            <p:cNvPr id="53" name="Rectangle 27"/>
             <p:cNvSpPr/>
             <p:nvPr/>
           </p:nvSpPr>
           <p:spPr>
             <a:xfrm>
-              <a:off x="4995720" y="1937520"/>
-              <a:ext cx="1686600" cy="302040"/>
+              <a:off x="5423818" y="1101935"/>
+              <a:ext cx="1686240" cy="301680"/>
             </a:xfrm>
             <a:prstGeom prst="rect">
               <a:avLst/>
@@ -3055,7 +3683,7 @@
             <a:noFill/>
             <a:ln>
               <a:solidFill>
-                <a:srgbClr val="2f5597"/>
+                <a:srgbClr val="2F5597"/>
               </a:solidFill>
             </a:ln>
           </p:spPr>
@@ -3074,9 +3702,10 @@
             <a:fontRef idx="minor"/>
           </p:style>
           <p:txBody>
-            <a:bodyPr lIns="90000" rIns="90000" tIns="45000" bIns="45000" anchor="ctr">
+            <a:bodyPr lIns="90000" tIns="45000" rIns="90000" bIns="45000" anchor="ctr">
               <a:noAutofit/>
             </a:bodyPr>
+            <a:lstStyle/>
             <a:p>
               <a:pPr algn="ctr">
                 <a:lnSpc>
@@ -3085,7 +3714,7 @@
                 <a:buNone/>
               </a:pPr>
               <a:r>
-                <a:rPr b="0" lang="en-US" sz="1800" spc="-1" strike="noStrike">
+                <a:rPr lang="en-US" sz="1800" b="0" strike="noStrike" spc="-1" dirty="0">
                   <a:solidFill>
                     <a:srgbClr val="000000"/>
                   </a:solidFill>
@@ -3094,7 +3723,7 @@
                 </a:rPr>
                 <a:t>3D CAD Model</a:t>
               </a:r>
-              <a:endParaRPr b="0" lang="en-US" sz="1800" spc="-1" strike="noStrike">
+              <a:endParaRPr lang="en-US" sz="1800" b="0" strike="noStrike" spc="-1" dirty="0">
                 <a:latin typeface="Arial"/>
               </a:endParaRPr>
             </a:p>
@@ -3102,14 +3731,14 @@
         </p:sp>
         <p:sp>
           <p:nvSpPr>
-            <p:cNvPr id="53" name="Rectangle 28"/>
+            <p:cNvPr id="54" name="Rectangle 28"/>
             <p:cNvSpPr/>
             <p:nvPr/>
           </p:nvSpPr>
           <p:spPr>
             <a:xfrm>
-              <a:off x="5216760" y="3024360"/>
-              <a:ext cx="1244880" cy="713160"/>
+              <a:off x="6945540" y="4122983"/>
+              <a:ext cx="1244520" cy="712800"/>
             </a:xfrm>
             <a:prstGeom prst="rect">
               <a:avLst/>
@@ -3117,7 +3746,7 @@
             <a:noFill/>
             <a:ln>
               <a:solidFill>
-                <a:srgbClr val="2f5597"/>
+                <a:srgbClr val="2F5597"/>
               </a:solidFill>
             </a:ln>
           </p:spPr>
@@ -3136,9 +3765,10 @@
             <a:fontRef idx="minor"/>
           </p:style>
           <p:txBody>
-            <a:bodyPr lIns="90000" rIns="90000" tIns="45000" bIns="45000" anchor="ctr">
+            <a:bodyPr lIns="90000" tIns="45000" rIns="90000" bIns="45000" anchor="ctr">
               <a:noAutofit/>
             </a:bodyPr>
+            <a:lstStyle/>
             <a:p>
               <a:pPr algn="ctr">
                 <a:lnSpc>
@@ -3147,16 +3777,16 @@
                 <a:buNone/>
               </a:pPr>
               <a:r>
-                <a:rPr b="0" lang="en-US" sz="1800" spc="-1" strike="noStrike">
+                <a:rPr lang="en-US" sz="1800" b="0" strike="noStrike" spc="-1" dirty="0">
                   <a:solidFill>
                     <a:srgbClr val="000000"/>
                   </a:solidFill>
                   <a:latin typeface="Times New Roman"/>
                   <a:ea typeface="DejaVu Sans"/>
                 </a:rPr>
-                <a:t>ICP Matching</a:t>
+                <a:t>ICP refining</a:t>
               </a:r>
-              <a:endParaRPr b="0" lang="en-US" sz="1800" spc="-1" strike="noStrike">
+              <a:endParaRPr lang="en-US" sz="1800" b="0" strike="noStrike" spc="-1" dirty="0">
                 <a:latin typeface="Arial"/>
               </a:endParaRPr>
             </a:p>
@@ -3164,110 +3794,14 @@
         </p:sp>
         <p:sp>
           <p:nvSpPr>
-            <p:cNvPr id="54" name="Straight Arrow Connector 29"/>
+            <p:cNvPr id="57" name="Rectangle 35"/>
             <p:cNvSpPr/>
             <p:nvPr/>
           </p:nvSpPr>
           <p:spPr>
             <a:xfrm>
-              <a:off x="4795920" y="3381120"/>
-              <a:ext cx="420120" cy="360"/>
-            </a:xfrm>
-            <a:custGeom>
-              <a:avLst/>
-              <a:gdLst/>
-              <a:ahLst/>
-              <a:rect l="l" t="t" r="r" b="b"/>
-              <a:pathLst>
-                <a:path w="21600" h="21600">
-                  <a:moveTo>
-                    <a:pt x="0" y="0"/>
-                  </a:moveTo>
-                  <a:lnTo>
-                    <a:pt x="21600" y="21600"/>
-                  </a:lnTo>
-                </a:path>
-              </a:pathLst>
-            </a:custGeom>
-            <a:noFill/>
-            <a:ln>
-              <a:solidFill>
-                <a:srgbClr val="000000"/>
-              </a:solidFill>
-              <a:tailEnd len="med" type="triangle" w="med"/>
-            </a:ln>
-          </p:spPr>
-          <p:style>
-            <a:lnRef idx="1">
-              <a:schemeClr val="accent1"/>
-            </a:lnRef>
-            <a:fillRef idx="0">
-              <a:schemeClr val="accent1"/>
-            </a:fillRef>
-            <a:effectRef idx="0">
-              <a:schemeClr val="accent1"/>
-            </a:effectRef>
-            <a:fontRef idx="minor"/>
-          </p:style>
-        </p:sp>
-        <p:sp>
-          <p:nvSpPr>
-            <p:cNvPr id="55" name="Straight Arrow Connector 34"/>
-            <p:cNvSpPr/>
-            <p:nvPr/>
-          </p:nvSpPr>
-          <p:spPr>
-            <a:xfrm>
-              <a:off x="5839560" y="2240280"/>
-              <a:ext cx="360" cy="783000"/>
-            </a:xfrm>
-            <a:custGeom>
-              <a:avLst/>
-              <a:gdLst/>
-              <a:ahLst/>
-              <a:rect l="l" t="t" r="r" b="b"/>
-              <a:pathLst>
-                <a:path w="21600" h="21600">
-                  <a:moveTo>
-                    <a:pt x="0" y="0"/>
-                  </a:moveTo>
-                  <a:lnTo>
-                    <a:pt x="21600" y="21600"/>
-                  </a:lnTo>
-                </a:path>
-              </a:pathLst>
-            </a:custGeom>
-            <a:noFill/>
-            <a:ln>
-              <a:solidFill>
-                <a:srgbClr val="000000"/>
-              </a:solidFill>
-              <a:tailEnd len="med" type="triangle" w="med"/>
-            </a:ln>
-          </p:spPr>
-          <p:style>
-            <a:lnRef idx="1">
-              <a:schemeClr val="accent1"/>
-            </a:lnRef>
-            <a:fillRef idx="0">
-              <a:schemeClr val="accent1"/>
-            </a:fillRef>
-            <a:effectRef idx="0">
-              <a:schemeClr val="accent1"/>
-            </a:effectRef>
-            <a:fontRef idx="minor"/>
-          </p:style>
-        </p:sp>
-        <p:sp>
-          <p:nvSpPr>
-            <p:cNvPr id="56" name="Rectangle 35"/>
-            <p:cNvSpPr/>
-            <p:nvPr/>
-          </p:nvSpPr>
-          <p:spPr>
-            <a:xfrm>
-              <a:off x="6816960" y="3024360"/>
-              <a:ext cx="1446840" cy="713160"/>
+              <a:off x="6844560" y="5220750"/>
+              <a:ext cx="1446480" cy="712800"/>
             </a:xfrm>
             <a:prstGeom prst="rect">
               <a:avLst/>
@@ -3275,7 +3809,7 @@
             <a:noFill/>
             <a:ln>
               <a:solidFill>
-                <a:srgbClr val="2f5597"/>
+                <a:srgbClr val="2F5597"/>
               </a:solidFill>
             </a:ln>
           </p:spPr>
@@ -3294,9 +3828,10 @@
             <a:fontRef idx="minor"/>
           </p:style>
           <p:txBody>
-            <a:bodyPr lIns="90000" rIns="90000" tIns="45000" bIns="45000" anchor="ctr">
+            <a:bodyPr lIns="90000" tIns="45000" rIns="90000" bIns="45000" anchor="ctr">
               <a:noAutofit/>
             </a:bodyPr>
+            <a:lstStyle/>
             <a:p>
               <a:pPr algn="ctr">
                 <a:lnSpc>
@@ -3305,7 +3840,7 @@
                 <a:buNone/>
               </a:pPr>
               <a:r>
-                <a:rPr b="0" lang="en-US" sz="1800" spc="-1" strike="noStrike">
+                <a:rPr lang="en-US" sz="1800" b="0" strike="noStrike" spc="-1">
                   <a:solidFill>
                     <a:srgbClr val="000000"/>
                   </a:solidFill>
@@ -3314,7 +3849,7 @@
                 </a:rPr>
                 <a:t>Object Pose estimation</a:t>
               </a:r>
-              <a:endParaRPr b="0" lang="en-US" sz="1800" spc="-1" strike="noStrike">
+              <a:endParaRPr lang="en-US" sz="1800" b="0" strike="noStrike" spc="-1">
                 <a:latin typeface="Arial"/>
               </a:endParaRPr>
             </a:p>
@@ -3322,62 +3857,14 @@
         </p:sp>
         <p:sp>
           <p:nvSpPr>
-            <p:cNvPr id="57" name="Straight Arrow Connector 40"/>
+            <p:cNvPr id="59" name="Rectangle 44"/>
             <p:cNvSpPr/>
             <p:nvPr/>
           </p:nvSpPr>
           <p:spPr>
             <a:xfrm>
-              <a:off x="6462360" y="3381120"/>
-              <a:ext cx="353880" cy="360"/>
-            </a:xfrm>
-            <a:custGeom>
-              <a:avLst/>
-              <a:gdLst/>
-              <a:ahLst/>
-              <a:rect l="l" t="t" r="r" b="b"/>
-              <a:pathLst>
-                <a:path w="21600" h="21600">
-                  <a:moveTo>
-                    <a:pt x="0" y="0"/>
-                  </a:moveTo>
-                  <a:lnTo>
-                    <a:pt x="21600" y="21600"/>
-                  </a:lnTo>
-                </a:path>
-              </a:pathLst>
-            </a:custGeom>
-            <a:noFill/>
-            <a:ln>
-              <a:solidFill>
-                <a:srgbClr val="000000"/>
-              </a:solidFill>
-              <a:tailEnd len="med" type="triangle" w="med"/>
-            </a:ln>
-          </p:spPr>
-          <p:style>
-            <a:lnRef idx="1">
-              <a:schemeClr val="accent1"/>
-            </a:lnRef>
-            <a:fillRef idx="0">
-              <a:schemeClr val="accent1"/>
-            </a:fillRef>
-            <a:effectRef idx="0">
-              <a:schemeClr val="accent1"/>
-            </a:effectRef>
-            <a:fontRef idx="minor"/>
-          </p:style>
-        </p:sp>
-        <p:sp>
-          <p:nvSpPr>
-            <p:cNvPr id="58" name="Rectangle 44"/>
-            <p:cNvSpPr/>
-            <p:nvPr/>
-          </p:nvSpPr>
-          <p:spPr>
-            <a:xfrm>
-              <a:off x="8636760" y="3024360"/>
-              <a:ext cx="1446840" cy="713160"/>
+              <a:off x="8779622" y="5220410"/>
+              <a:ext cx="1446480" cy="712800"/>
             </a:xfrm>
             <a:prstGeom prst="rect">
               <a:avLst/>
@@ -3385,7 +3872,7 @@
             <a:noFill/>
             <a:ln>
               <a:solidFill>
-                <a:srgbClr val="2f5597"/>
+                <a:srgbClr val="2F5597"/>
               </a:solidFill>
             </a:ln>
           </p:spPr>
@@ -3404,9 +3891,10 @@
             <a:fontRef idx="minor"/>
           </p:style>
           <p:txBody>
-            <a:bodyPr lIns="90000" rIns="90000" tIns="45000" bIns="45000" anchor="ctr">
+            <a:bodyPr lIns="90000" tIns="45000" rIns="90000" bIns="45000" anchor="ctr">
               <a:noAutofit/>
             </a:bodyPr>
+            <a:lstStyle/>
             <a:p>
               <a:pPr algn="ctr">
                 <a:lnSpc>
@@ -3415,7 +3903,7 @@
                 <a:buNone/>
               </a:pPr>
               <a:r>
-                <a:rPr b="0" lang="en-US" sz="1800" spc="-1" strike="noStrike">
+                <a:rPr lang="en-US" sz="1800" b="0" strike="noStrike" spc="-1">
                   <a:solidFill>
                     <a:srgbClr val="000000"/>
                   </a:solidFill>
@@ -3424,7 +3912,122 @@
                 </a:rPr>
                 <a:t>Grasp planning </a:t>
               </a:r>
-              <a:endParaRPr b="0" lang="en-US" sz="1800" spc="-1" strike="noStrike">
+              <a:endParaRPr lang="en-US" sz="1800" b="0" strike="noStrike" spc="-1">
+                <a:latin typeface="Arial"/>
+              </a:endParaRPr>
+            </a:p>
+          </p:txBody>
+        </p:sp>
+        <p:pic>
+          <p:nvPicPr>
+            <p:cNvPr id="62" name="Picture 61"/>
+            <p:cNvPicPr/>
+            <p:nvPr/>
+          </p:nvPicPr>
+          <p:blipFill>
+            <a:blip r:embed="rId4"/>
+            <a:stretch/>
+          </p:blipFill>
+          <p:spPr>
+            <a:xfrm>
+              <a:off x="8689728" y="1411873"/>
+              <a:ext cx="2717595" cy="1795975"/>
+            </a:xfrm>
+            <a:prstGeom prst="rect">
+              <a:avLst/>
+            </a:prstGeom>
+            <a:ln w="0">
+              <a:noFill/>
+            </a:ln>
+          </p:spPr>
+        </p:pic>
+        <p:pic>
+          <p:nvPicPr>
+            <p:cNvPr id="63" name="Picture 62"/>
+            <p:cNvPicPr/>
+            <p:nvPr/>
+          </p:nvPicPr>
+          <p:blipFill>
+            <a:blip r:embed="rId5"/>
+            <a:stretch/>
+          </p:blipFill>
+          <p:spPr>
+            <a:xfrm>
+              <a:off x="3891461" y="699730"/>
+              <a:ext cx="1371600" cy="1160280"/>
+            </a:xfrm>
+            <a:prstGeom prst="rect">
+              <a:avLst/>
+            </a:prstGeom>
+            <a:ln w="0">
+              <a:noFill/>
+            </a:ln>
+          </p:spPr>
+        </p:pic>
+        <p:sp>
+          <p:nvSpPr>
+            <p:cNvPr id="25" name="Rectangle 27">
+              <a:extLst>
+                <a:ext uri="{FF2B5EF4-FFF2-40B4-BE49-F238E27FC236}">
+                  <a16:creationId xmlns:a16="http://schemas.microsoft.com/office/drawing/2014/main" id="{7D9AD672-CF37-4C50-9D74-DA71F43D44D0}"/>
+                </a:ext>
+              </a:extLst>
+            </p:cNvPr>
+            <p:cNvSpPr/>
+            <p:nvPr/>
+          </p:nvSpPr>
+          <p:spPr>
+            <a:xfrm>
+              <a:off x="4787664" y="2047985"/>
+              <a:ext cx="1686240" cy="301680"/>
+            </a:xfrm>
+            <a:prstGeom prst="rect">
+              <a:avLst/>
+            </a:prstGeom>
+            <a:noFill/>
+            <a:ln>
+              <a:solidFill>
+                <a:srgbClr val="2F5597"/>
+              </a:solidFill>
+            </a:ln>
+          </p:spPr>
+          <p:style>
+            <a:lnRef idx="2">
+              <a:schemeClr val="accent1">
+                <a:shade val="50000"/>
+              </a:schemeClr>
+            </a:lnRef>
+            <a:fillRef idx="1">
+              <a:schemeClr val="accent1"/>
+            </a:fillRef>
+            <a:effectRef idx="0">
+              <a:schemeClr val="accent1"/>
+            </a:effectRef>
+            <a:fontRef idx="minor"/>
+          </p:style>
+          <p:txBody>
+            <a:bodyPr lIns="90000" tIns="45000" rIns="90000" bIns="45000" anchor="ctr">
+              <a:noAutofit/>
+            </a:bodyPr>
+            <a:lstStyle/>
+            <a:p>
+              <a:pPr algn="ctr">
+                <a:lnSpc>
+                  <a:spcPct val="100000"/>
+                </a:lnSpc>
+                <a:buNone/>
+              </a:pPr>
+              <a:r>
+                <a:rPr lang="en-US" sz="1800" b="0" strike="noStrike" spc="-1" dirty="0">
+                  <a:solidFill>
+                    <a:srgbClr val="000000"/>
+                  </a:solidFill>
+                  <a:latin typeface="Times New Roman"/>
+                  <a:ea typeface="DejaVu Sans"/>
+                </a:rPr>
+                <a:t>Blender</a:t>
+              </a:r>
+              <a:endParaRPr lang="en-US" sz="1800" b="0" strike="noStrike" spc="-1" dirty="0">
                 <a:latin typeface="Arial"/>
               </a:endParaRPr>
             </a:p>
@@ -3432,44 +4035,38 @@
         </p:sp>
         <p:sp>
           <p:nvSpPr>
-            <p:cNvPr id="59" name="Straight Arrow Connector 45"/>
+            <p:cNvPr id="26" name="Rectangle 27">
+              <a:extLst>
+                <a:ext uri="{FF2B5EF4-FFF2-40B4-BE49-F238E27FC236}">
+                  <a16:creationId xmlns:a16="http://schemas.microsoft.com/office/drawing/2014/main" id="{33B66C69-2AB9-4B98-8267-13DEE39E088E}"/>
+                </a:ext>
+              </a:extLst>
+            </p:cNvPr>
             <p:cNvSpPr/>
             <p:nvPr/>
           </p:nvSpPr>
           <p:spPr>
             <a:xfrm>
-              <a:off x="8264520" y="3383640"/>
-              <a:ext cx="353880" cy="360"/>
+              <a:off x="6719664" y="2042420"/>
+              <a:ext cx="1686240" cy="543788"/>
             </a:xfrm>
-            <a:custGeom>
+            <a:prstGeom prst="rect">
               <a:avLst/>
-              <a:gdLst/>
-              <a:ahLst/>
-              <a:rect l="l" t="t" r="r" b="b"/>
-              <a:pathLst>
-                <a:path w="21600" h="21600">
-                  <a:moveTo>
-                    <a:pt x="0" y="0"/>
-                  </a:moveTo>
-                  <a:lnTo>
-                    <a:pt x="21600" y="21600"/>
-                  </a:lnTo>
-                </a:path>
-              </a:pathLst>
-            </a:custGeom>
+            </a:prstGeom>
             <a:noFill/>
             <a:ln>
               <a:solidFill>
-                <a:srgbClr val="000000"/>
+                <a:srgbClr val="2F5597"/>
               </a:solidFill>
-              <a:tailEnd len="med" type="triangle" w="med"/>
             </a:ln>
           </p:spPr>
           <p:style>
-            <a:lnRef idx="1">
-              <a:schemeClr val="accent1"/>
+            <a:lnRef idx="2">
+              <a:schemeClr val="accent1">
+                <a:shade val="50000"/>
+              </a:schemeClr>
             </a:lnRef>
-            <a:fillRef idx="0">
+            <a:fillRef idx="1">
               <a:schemeClr val="accent1"/>
             </a:fillRef>
             <a:effectRef idx="0">
@@ -3477,40 +4074,200 @@
             </a:effectRef>
             <a:fontRef idx="minor"/>
           </p:style>
+          <p:txBody>
+            <a:bodyPr lIns="90000" tIns="45000" rIns="90000" bIns="45000" anchor="ctr">
+              <a:noAutofit/>
+            </a:bodyPr>
+            <a:lstStyle/>
+            <a:p>
+              <a:pPr algn="ctr">
+                <a:lnSpc>
+                  <a:spcPct val="100000"/>
+                </a:lnSpc>
+                <a:buNone/>
+              </a:pPr>
+              <a:r>
+                <a:rPr lang="en-US" sz="1800" b="0" strike="noStrike" spc="-1" dirty="0">
+                  <a:solidFill>
+                    <a:srgbClr val="000000"/>
+                  </a:solidFill>
+                  <a:latin typeface="Times New Roman"/>
+                  <a:ea typeface="DejaVu Sans"/>
+                </a:rPr>
+                <a:t>Partial point clouds</a:t>
+              </a:r>
+              <a:endParaRPr lang="en-US" sz="1800" b="0" strike="noStrike" spc="-1" dirty="0">
+                <a:latin typeface="Arial"/>
+              </a:endParaRPr>
+            </a:p>
+          </p:txBody>
         </p:sp>
         <p:sp>
           <p:nvSpPr>
-            <p:cNvPr id="60" name="Straight Arrow Connector 46"/>
+            <p:cNvPr id="28" name="Rectangle 28">
+              <a:extLst>
+                <a:ext uri="{FF2B5EF4-FFF2-40B4-BE49-F238E27FC236}">
+                  <a16:creationId xmlns:a16="http://schemas.microsoft.com/office/drawing/2014/main" id="{1F627C15-FBFA-48B4-B827-FFF850A3C7F3}"/>
+                </a:ext>
+              </a:extLst>
+            </p:cNvPr>
             <p:cNvSpPr/>
             <p:nvPr/>
           </p:nvSpPr>
           <p:spPr>
             <a:xfrm>
-              <a:off x="10084320" y="3372480"/>
-              <a:ext cx="353880" cy="360"/>
+              <a:off x="5013540" y="3025556"/>
+              <a:ext cx="1244520" cy="712800"/>
             </a:xfrm>
-            <a:custGeom>
+            <a:prstGeom prst="rect">
               <a:avLst/>
-              <a:gdLst/>
-              <a:ahLst/>
-              <a:rect l="l" t="t" r="r" b="b"/>
-              <a:pathLst>
-                <a:path w="21600" h="21600">
-                  <a:moveTo>
-                    <a:pt x="0" y="0"/>
-                  </a:moveTo>
-                  <a:lnTo>
-                    <a:pt x="21600" y="21600"/>
-                  </a:lnTo>
-                </a:path>
-              </a:pathLst>
-            </a:custGeom>
+            </a:prstGeom>
             <a:noFill/>
             <a:ln>
               <a:solidFill>
-                <a:srgbClr val="000000"/>
+                <a:srgbClr val="2F5597"/>
               </a:solidFill>
-              <a:tailEnd len="med" type="triangle" w="med"/>
+            </a:ln>
+          </p:spPr>
+          <p:style>
+            <a:lnRef idx="2">
+              <a:schemeClr val="accent1">
+                <a:shade val="50000"/>
+              </a:schemeClr>
+            </a:lnRef>
+            <a:fillRef idx="1">
+              <a:schemeClr val="accent1"/>
+            </a:fillRef>
+            <a:effectRef idx="0">
+              <a:schemeClr val="accent1"/>
+            </a:effectRef>
+            <a:fontRef idx="minor"/>
+          </p:style>
+          <p:txBody>
+            <a:bodyPr lIns="90000" tIns="45000" rIns="90000" bIns="45000" anchor="ctr">
+              <a:noAutofit/>
+            </a:bodyPr>
+            <a:lstStyle/>
+            <a:p>
+              <a:pPr algn="ctr">
+                <a:lnSpc>
+                  <a:spcPct val="100000"/>
+                </a:lnSpc>
+                <a:buNone/>
+              </a:pPr>
+              <a:r>
+                <a:rPr lang="en-US" sz="1800" b="0" strike="noStrike" spc="-1" dirty="0">
+                  <a:solidFill>
+                    <a:srgbClr val="000000"/>
+                  </a:solidFill>
+                  <a:latin typeface="Times New Roman"/>
+                  <a:ea typeface="DejaVu Sans"/>
+                </a:rPr>
+                <a:t>Similarity checking</a:t>
+              </a:r>
+              <a:endParaRPr lang="en-US" sz="1800" b="0" strike="noStrike" spc="-1" dirty="0">
+                <a:latin typeface="Arial"/>
+              </a:endParaRPr>
+            </a:p>
+          </p:txBody>
+        </p:sp>
+        <p:sp>
+          <p:nvSpPr>
+            <p:cNvPr id="29" name="Rectangle 28">
+              <a:extLst>
+                <a:ext uri="{FF2B5EF4-FFF2-40B4-BE49-F238E27FC236}">
+                  <a16:creationId xmlns:a16="http://schemas.microsoft.com/office/drawing/2014/main" id="{FDCB5256-62A3-4F1A-9267-9916286D4297}"/>
+                </a:ext>
+              </a:extLst>
+            </p:cNvPr>
+            <p:cNvSpPr/>
+            <p:nvPr/>
+          </p:nvSpPr>
+          <p:spPr>
+            <a:xfrm>
+              <a:off x="6673710" y="3025556"/>
+              <a:ext cx="1788180" cy="712800"/>
+            </a:xfrm>
+            <a:prstGeom prst="rect">
+              <a:avLst/>
+            </a:prstGeom>
+            <a:noFill/>
+            <a:ln>
+              <a:solidFill>
+                <a:srgbClr val="2F5597"/>
+              </a:solidFill>
+            </a:ln>
+          </p:spPr>
+          <p:style>
+            <a:lnRef idx="2">
+              <a:schemeClr val="accent1">
+                <a:shade val="50000"/>
+              </a:schemeClr>
+            </a:lnRef>
+            <a:fillRef idx="1">
+              <a:schemeClr val="accent1"/>
+            </a:fillRef>
+            <a:effectRef idx="0">
+              <a:schemeClr val="accent1"/>
+            </a:effectRef>
+            <a:fontRef idx="minor"/>
+          </p:style>
+          <p:txBody>
+            <a:bodyPr lIns="90000" tIns="45000" rIns="90000" bIns="45000" anchor="ctr">
+              <a:noAutofit/>
+            </a:bodyPr>
+            <a:lstStyle/>
+            <a:p>
+              <a:pPr algn="ctr">
+                <a:lnSpc>
+                  <a:spcPct val="100000"/>
+                </a:lnSpc>
+                <a:buNone/>
+              </a:pPr>
+              <a:r>
+                <a:rPr lang="en-US" sz="1800" b="0" strike="noStrike" spc="-1" dirty="0">
+                  <a:solidFill>
+                    <a:srgbClr val="000000"/>
+                  </a:solidFill>
+                  <a:latin typeface="Times New Roman"/>
+                  <a:ea typeface="DejaVu Sans"/>
+                </a:rPr>
+                <a:t>Pair wise point feature</a:t>
+              </a:r>
+              <a:endParaRPr lang="en-US" sz="1800" b="0" strike="noStrike" spc="-1" dirty="0">
+                <a:latin typeface="Arial"/>
+              </a:endParaRPr>
+            </a:p>
+          </p:txBody>
+        </p:sp>
+        <p:cxnSp>
+          <p:nvCxnSpPr>
+            <p:cNvPr id="3" name="Connector: Elbow 2">
+              <a:extLst>
+                <a:ext uri="{FF2B5EF4-FFF2-40B4-BE49-F238E27FC236}">
+                  <a16:creationId xmlns:a16="http://schemas.microsoft.com/office/drawing/2014/main" id="{BAF3903B-0888-4821-A8D1-AC89A47B522E}"/>
+                </a:ext>
+              </a:extLst>
+            </p:cNvPr>
+            <p:cNvCxnSpPr>
+              <a:stCxn id="53" idx="2"/>
+              <a:endCxn id="25" idx="0"/>
+            </p:cNvCxnSpPr>
+            <p:nvPr/>
+          </p:nvCxnSpPr>
+          <p:spPr>
+            <a:xfrm rot="5400000">
+              <a:off x="5626676" y="1407723"/>
+              <a:ext cx="644370" cy="636154"/>
+            </a:xfrm>
+            <a:prstGeom prst="bentConnector3">
+              <a:avLst/>
+            </a:prstGeom>
+            <a:ln>
+              <a:solidFill>
+                <a:schemeClr val="tx1"/>
+              </a:solidFill>
+              <a:tailEnd type="triangle"/>
             </a:ln>
           </p:spPr>
           <p:style>
@@ -3523,66 +4280,424 @@
             <a:effectRef idx="0">
               <a:schemeClr val="accent1"/>
             </a:effectRef>
-            <a:fontRef idx="minor"/>
+            <a:fontRef idx="minor">
+              <a:schemeClr val="tx1"/>
+            </a:fontRef>
           </p:style>
-        </p:sp>
+        </p:cxnSp>
+        <p:cxnSp>
+          <p:nvCxnSpPr>
+            <p:cNvPr id="33" name="Connector: Elbow 32">
+              <a:extLst>
+                <a:ext uri="{FF2B5EF4-FFF2-40B4-BE49-F238E27FC236}">
+                  <a16:creationId xmlns:a16="http://schemas.microsoft.com/office/drawing/2014/main" id="{B84AF8E5-CD87-4F99-84A6-384DA8E439CD}"/>
+                </a:ext>
+              </a:extLst>
+            </p:cNvPr>
+            <p:cNvCxnSpPr>
+              <a:cxnSpLocks/>
+              <a:stCxn id="53" idx="2"/>
+              <a:endCxn id="26" idx="0"/>
+            </p:cNvCxnSpPr>
+            <p:nvPr/>
+          </p:nvCxnSpPr>
+          <p:spPr>
+            <a:xfrm rot="16200000" flipH="1">
+              <a:off x="6595459" y="1075094"/>
+              <a:ext cx="638805" cy="1295846"/>
+            </a:xfrm>
+            <a:prstGeom prst="bentConnector3">
+              <a:avLst/>
+            </a:prstGeom>
+            <a:ln>
+              <a:solidFill>
+                <a:schemeClr val="tx1"/>
+              </a:solidFill>
+              <a:tailEnd type="triangle"/>
+            </a:ln>
+          </p:spPr>
+          <p:style>
+            <a:lnRef idx="1">
+              <a:schemeClr val="accent1"/>
+            </a:lnRef>
+            <a:fillRef idx="0">
+              <a:schemeClr val="accent1"/>
+            </a:fillRef>
+            <a:effectRef idx="0">
+              <a:schemeClr val="accent1"/>
+            </a:effectRef>
+            <a:fontRef idx="minor">
+              <a:schemeClr val="tx1"/>
+            </a:fontRef>
+          </p:style>
+        </p:cxnSp>
+        <p:cxnSp>
+          <p:nvCxnSpPr>
+            <p:cNvPr id="8" name="Straight Arrow Connector 7">
+              <a:extLst>
+                <a:ext uri="{FF2B5EF4-FFF2-40B4-BE49-F238E27FC236}">
+                  <a16:creationId xmlns:a16="http://schemas.microsoft.com/office/drawing/2014/main" id="{F21E306A-D7A2-4AB5-BF47-247FBC3C59CD}"/>
+                </a:ext>
+              </a:extLst>
+            </p:cNvPr>
+            <p:cNvCxnSpPr>
+              <a:stCxn id="25" idx="2"/>
+              <a:endCxn id="28" idx="0"/>
+            </p:cNvCxnSpPr>
+            <p:nvPr/>
+          </p:nvCxnSpPr>
+          <p:spPr>
+            <a:xfrm>
+              <a:off x="5630784" y="2349665"/>
+              <a:ext cx="5016" cy="675891"/>
+            </a:xfrm>
+            <a:prstGeom prst="straightConnector1">
+              <a:avLst/>
+            </a:prstGeom>
+            <a:ln>
+              <a:solidFill>
+                <a:schemeClr val="tx1"/>
+              </a:solidFill>
+              <a:tailEnd type="triangle"/>
+            </a:ln>
+          </p:spPr>
+          <p:style>
+            <a:lnRef idx="1">
+              <a:schemeClr val="accent1"/>
+            </a:lnRef>
+            <a:fillRef idx="0">
+              <a:schemeClr val="accent1"/>
+            </a:fillRef>
+            <a:effectRef idx="0">
+              <a:schemeClr val="accent1"/>
+            </a:effectRef>
+            <a:fontRef idx="minor">
+              <a:schemeClr val="tx1"/>
+            </a:fontRef>
+          </p:style>
+        </p:cxnSp>
+        <p:cxnSp>
+          <p:nvCxnSpPr>
+            <p:cNvPr id="40" name="Straight Arrow Connector 39">
+              <a:extLst>
+                <a:ext uri="{FF2B5EF4-FFF2-40B4-BE49-F238E27FC236}">
+                  <a16:creationId xmlns:a16="http://schemas.microsoft.com/office/drawing/2014/main" id="{CCB5AB8E-D77A-48E8-93AA-338B103F6F5D}"/>
+                </a:ext>
+              </a:extLst>
+            </p:cNvPr>
+            <p:cNvCxnSpPr>
+              <a:cxnSpLocks/>
+              <a:stCxn id="26" idx="2"/>
+              <a:endCxn id="29" idx="0"/>
+            </p:cNvCxnSpPr>
+            <p:nvPr/>
+          </p:nvCxnSpPr>
+          <p:spPr>
+            <a:xfrm>
+              <a:off x="7562784" y="2586208"/>
+              <a:ext cx="5016" cy="439348"/>
+            </a:xfrm>
+            <a:prstGeom prst="straightConnector1">
+              <a:avLst/>
+            </a:prstGeom>
+            <a:ln>
+              <a:solidFill>
+                <a:schemeClr val="tx1"/>
+              </a:solidFill>
+              <a:tailEnd type="triangle"/>
+            </a:ln>
+          </p:spPr>
+          <p:style>
+            <a:lnRef idx="1">
+              <a:schemeClr val="accent1"/>
+            </a:lnRef>
+            <a:fillRef idx="0">
+              <a:schemeClr val="accent1"/>
+            </a:fillRef>
+            <a:effectRef idx="0">
+              <a:schemeClr val="accent1"/>
+            </a:effectRef>
+            <a:fontRef idx="minor">
+              <a:schemeClr val="tx1"/>
+            </a:fontRef>
+          </p:style>
+        </p:cxnSp>
+        <p:cxnSp>
+          <p:nvCxnSpPr>
+            <p:cNvPr id="15" name="Straight Arrow Connector 14">
+              <a:extLst>
+                <a:ext uri="{FF2B5EF4-FFF2-40B4-BE49-F238E27FC236}">
+                  <a16:creationId xmlns:a16="http://schemas.microsoft.com/office/drawing/2014/main" id="{D13DC843-50B7-49FF-BE05-12BC3EF57E22}"/>
+                </a:ext>
+              </a:extLst>
+            </p:cNvPr>
+            <p:cNvCxnSpPr>
+              <a:stCxn id="50" idx="3"/>
+              <a:endCxn id="28" idx="1"/>
+            </p:cNvCxnSpPr>
+            <p:nvPr/>
+          </p:nvCxnSpPr>
+          <p:spPr>
+            <a:xfrm>
+              <a:off x="4794840" y="3380580"/>
+              <a:ext cx="218700" cy="1376"/>
+            </a:xfrm>
+            <a:prstGeom prst="straightConnector1">
+              <a:avLst/>
+            </a:prstGeom>
+            <a:ln>
+              <a:solidFill>
+                <a:schemeClr val="tx1"/>
+              </a:solidFill>
+              <a:tailEnd type="triangle"/>
+            </a:ln>
+          </p:spPr>
+          <p:style>
+            <a:lnRef idx="1">
+              <a:schemeClr val="accent1"/>
+            </a:lnRef>
+            <a:fillRef idx="0">
+              <a:schemeClr val="accent1"/>
+            </a:fillRef>
+            <a:effectRef idx="0">
+              <a:schemeClr val="accent1"/>
+            </a:effectRef>
+            <a:fontRef idx="minor">
+              <a:schemeClr val="tx1"/>
+            </a:fontRef>
+          </p:style>
+        </p:cxnSp>
+        <p:cxnSp>
+          <p:nvCxnSpPr>
+            <p:cNvPr id="17" name="Straight Arrow Connector 16">
+              <a:extLst>
+                <a:ext uri="{FF2B5EF4-FFF2-40B4-BE49-F238E27FC236}">
+                  <a16:creationId xmlns:a16="http://schemas.microsoft.com/office/drawing/2014/main" id="{96B290C0-2050-4C5F-9969-1A71B3B17D97}"/>
+                </a:ext>
+              </a:extLst>
+            </p:cNvPr>
+            <p:cNvCxnSpPr>
+              <a:cxnSpLocks/>
+              <a:stCxn id="28" idx="3"/>
+              <a:endCxn id="29" idx="1"/>
+            </p:cNvCxnSpPr>
+            <p:nvPr/>
+          </p:nvCxnSpPr>
+          <p:spPr>
+            <a:xfrm>
+              <a:off x="6258060" y="3381956"/>
+              <a:ext cx="415650" cy="0"/>
+            </a:xfrm>
+            <a:prstGeom prst="straightConnector1">
+              <a:avLst/>
+            </a:prstGeom>
+            <a:ln>
+              <a:solidFill>
+                <a:schemeClr val="tx1"/>
+              </a:solidFill>
+              <a:tailEnd type="triangle"/>
+            </a:ln>
+          </p:spPr>
+          <p:style>
+            <a:lnRef idx="1">
+              <a:schemeClr val="accent1"/>
+            </a:lnRef>
+            <a:fillRef idx="0">
+              <a:schemeClr val="accent1"/>
+            </a:fillRef>
+            <a:effectRef idx="0">
+              <a:schemeClr val="accent1"/>
+            </a:effectRef>
+            <a:fontRef idx="minor">
+              <a:schemeClr val="tx1"/>
+            </a:fontRef>
+          </p:style>
+        </p:cxnSp>
+        <p:cxnSp>
+          <p:nvCxnSpPr>
+            <p:cNvPr id="22" name="Straight Arrow Connector 21">
+              <a:extLst>
+                <a:ext uri="{FF2B5EF4-FFF2-40B4-BE49-F238E27FC236}">
+                  <a16:creationId xmlns:a16="http://schemas.microsoft.com/office/drawing/2014/main" id="{55232C00-2037-4E80-B1BD-6FC8BEB44600}"/>
+                </a:ext>
+              </a:extLst>
+            </p:cNvPr>
+            <p:cNvCxnSpPr>
+              <a:stCxn id="29" idx="2"/>
+              <a:endCxn id="54" idx="0"/>
+            </p:cNvCxnSpPr>
+            <p:nvPr/>
+          </p:nvCxnSpPr>
+          <p:spPr>
+            <a:xfrm>
+              <a:off x="7567800" y="3738356"/>
+              <a:ext cx="0" cy="384627"/>
+            </a:xfrm>
+            <a:prstGeom prst="straightConnector1">
+              <a:avLst/>
+            </a:prstGeom>
+            <a:ln>
+              <a:solidFill>
+                <a:schemeClr val="tx1"/>
+              </a:solidFill>
+              <a:tailEnd type="triangle"/>
+            </a:ln>
+          </p:spPr>
+          <p:style>
+            <a:lnRef idx="1">
+              <a:schemeClr val="accent1"/>
+            </a:lnRef>
+            <a:fillRef idx="0">
+              <a:schemeClr val="accent1"/>
+            </a:fillRef>
+            <a:effectRef idx="0">
+              <a:schemeClr val="accent1"/>
+            </a:effectRef>
+            <a:fontRef idx="minor">
+              <a:schemeClr val="tx1"/>
+            </a:fontRef>
+          </p:style>
+        </p:cxnSp>
+        <p:cxnSp>
+          <p:nvCxnSpPr>
+            <p:cNvPr id="24" name="Straight Arrow Connector 23">
+              <a:extLst>
+                <a:ext uri="{FF2B5EF4-FFF2-40B4-BE49-F238E27FC236}">
+                  <a16:creationId xmlns:a16="http://schemas.microsoft.com/office/drawing/2014/main" id="{638FFB47-6307-4CBA-9031-C07819E91FE4}"/>
+                </a:ext>
+              </a:extLst>
+            </p:cNvPr>
+            <p:cNvCxnSpPr>
+              <a:stCxn id="54" idx="2"/>
+              <a:endCxn id="57" idx="0"/>
+            </p:cNvCxnSpPr>
+            <p:nvPr/>
+          </p:nvCxnSpPr>
+          <p:spPr>
+            <a:xfrm>
+              <a:off x="7567800" y="4835783"/>
+              <a:ext cx="0" cy="384967"/>
+            </a:xfrm>
+            <a:prstGeom prst="straightConnector1">
+              <a:avLst/>
+            </a:prstGeom>
+            <a:ln>
+              <a:solidFill>
+                <a:schemeClr val="tx1"/>
+              </a:solidFill>
+              <a:tailEnd type="triangle"/>
+            </a:ln>
+          </p:spPr>
+          <p:style>
+            <a:lnRef idx="1">
+              <a:schemeClr val="accent1"/>
+            </a:lnRef>
+            <a:fillRef idx="0">
+              <a:schemeClr val="accent1"/>
+            </a:fillRef>
+            <a:effectRef idx="0">
+              <a:schemeClr val="accent1"/>
+            </a:effectRef>
+            <a:fontRef idx="minor">
+              <a:schemeClr val="tx1"/>
+            </a:fontRef>
+          </p:style>
+        </p:cxnSp>
+        <p:cxnSp>
+          <p:nvCxnSpPr>
+            <p:cNvPr id="34" name="Straight Arrow Connector 33">
+              <a:extLst>
+                <a:ext uri="{FF2B5EF4-FFF2-40B4-BE49-F238E27FC236}">
+                  <a16:creationId xmlns:a16="http://schemas.microsoft.com/office/drawing/2014/main" id="{492233AD-C1FA-43F9-8546-C5D8DD193DE7}"/>
+                </a:ext>
+              </a:extLst>
+            </p:cNvPr>
+            <p:cNvCxnSpPr>
+              <a:stCxn id="57" idx="3"/>
+              <a:endCxn id="59" idx="1"/>
+            </p:cNvCxnSpPr>
+            <p:nvPr/>
+          </p:nvCxnSpPr>
+          <p:spPr>
+            <a:xfrm flipV="1">
+              <a:off x="8291040" y="5576810"/>
+              <a:ext cx="488582" cy="340"/>
+            </a:xfrm>
+            <a:prstGeom prst="straightConnector1">
+              <a:avLst/>
+            </a:prstGeom>
+            <a:ln>
+              <a:solidFill>
+                <a:schemeClr val="tx1"/>
+              </a:solidFill>
+              <a:tailEnd type="triangle"/>
+            </a:ln>
+          </p:spPr>
+          <p:style>
+            <a:lnRef idx="1">
+              <a:schemeClr val="accent1"/>
+            </a:lnRef>
+            <a:fillRef idx="0">
+              <a:schemeClr val="accent1"/>
+            </a:fillRef>
+            <a:effectRef idx="0">
+              <a:schemeClr val="accent1"/>
+            </a:effectRef>
+            <a:fontRef idx="minor">
+              <a:schemeClr val="tx1"/>
+            </a:fontRef>
+          </p:style>
+        </p:cxnSp>
+        <p:cxnSp>
+          <p:nvCxnSpPr>
+            <p:cNvPr id="36" name="Straight Arrow Connector 35">
+              <a:extLst>
+                <a:ext uri="{FF2B5EF4-FFF2-40B4-BE49-F238E27FC236}">
+                  <a16:creationId xmlns:a16="http://schemas.microsoft.com/office/drawing/2014/main" id="{62E86018-9E33-44E1-B1F3-9DF1E4D96C93}"/>
+                </a:ext>
+              </a:extLst>
+            </p:cNvPr>
+            <p:cNvCxnSpPr>
+              <a:stCxn id="59" idx="3"/>
+            </p:cNvCxnSpPr>
+            <p:nvPr/>
+          </p:nvCxnSpPr>
+          <p:spPr>
+            <a:xfrm>
+              <a:off x="10226102" y="5576810"/>
+              <a:ext cx="720065" cy="0"/>
+            </a:xfrm>
+            <a:prstGeom prst="straightConnector1">
+              <a:avLst/>
+            </a:prstGeom>
+            <a:ln>
+              <a:solidFill>
+                <a:schemeClr val="tx1"/>
+              </a:solidFill>
+              <a:tailEnd type="triangle"/>
+            </a:ln>
+          </p:spPr>
+          <p:style>
+            <a:lnRef idx="1">
+              <a:schemeClr val="accent1"/>
+            </a:lnRef>
+            <a:fillRef idx="0">
+              <a:schemeClr val="accent1"/>
+            </a:fillRef>
+            <a:effectRef idx="0">
+              <a:schemeClr val="accent1"/>
+            </a:effectRef>
+            <a:fontRef idx="minor">
+              <a:schemeClr val="tx1"/>
+            </a:fontRef>
+          </p:style>
+        </p:cxnSp>
       </p:grpSp>
-      <p:pic>
-        <p:nvPicPr>
-          <p:cNvPr id="61" name="" descr=""/>
-          <p:cNvPicPr/>
-          <p:nvPr/>
-        </p:nvPicPr>
-        <p:blipFill>
-          <a:blip r:embed="rId3"/>
-          <a:stretch/>
-        </p:blipFill>
-        <p:spPr>
-          <a:xfrm>
-            <a:off x="7086600" y="685800"/>
-            <a:ext cx="3081600" cy="2057040"/>
-          </a:xfrm>
-          <a:prstGeom prst="rect">
-            <a:avLst/>
-          </a:prstGeom>
-          <a:ln w="0">
-            <a:noFill/>
-          </a:ln>
-        </p:spPr>
-      </p:pic>
-      <p:pic>
-        <p:nvPicPr>
-          <p:cNvPr id="62" name="" descr=""/>
-          <p:cNvPicPr/>
-          <p:nvPr/>
-        </p:nvPicPr>
-        <p:blipFill>
-          <a:blip r:embed="rId4"/>
-          <a:stretch/>
-        </p:blipFill>
-        <p:spPr>
-          <a:xfrm>
-            <a:off x="5715000" y="4114800"/>
-            <a:ext cx="2431800" cy="2057400"/>
-          </a:xfrm>
-          <a:prstGeom prst="rect">
-            <a:avLst/>
-          </a:prstGeom>
-          <a:ln w="0">
-            <a:noFill/>
-          </a:ln>
-        </p:spPr>
-      </p:pic>
     </p:spTree>
   </p:cSld>
-  <mc:AlternateContent>
-    <mc:Choice Requires="p14">
-      <p:transition spd="slow" p14:dur="2000"/>
-    </mc:Choice>
-    <mc:Fallback>
-      <p:transition spd="slow"/>
-    </mc:Fallback>
-  </mc:AlternateContent>
+  <p:clrMapOvr>
+    <a:masterClrMapping/>
+  </p:clrMapOvr>
 </p:sld>
 </file>
 
@@ -3597,34 +4712,34 @@
         <a:sysClr val="window" lastClr="FFFFFF"/>
       </a:lt1>
       <a:dk2>
-        <a:srgbClr val="44546a"/>
+        <a:srgbClr val="44546A"/>
       </a:dk2>
       <a:lt2>
-        <a:srgbClr val="e7e6e6"/>
+        <a:srgbClr val="E7E6E6"/>
       </a:lt2>
       <a:accent1>
-        <a:srgbClr val="4472c4"/>
+        <a:srgbClr val="4472C4"/>
       </a:accent1>
       <a:accent2>
-        <a:srgbClr val="ed7d31"/>
+        <a:srgbClr val="ED7D31"/>
       </a:accent2>
       <a:accent3>
-        <a:srgbClr val="a5a5a5"/>
+        <a:srgbClr val="A5A5A5"/>
       </a:accent3>
       <a:accent4>
-        <a:srgbClr val="ffc000"/>
+        <a:srgbClr val="FFC000"/>
       </a:accent4>
       <a:accent5>
-        <a:srgbClr val="5b9bd5"/>
+        <a:srgbClr val="5B9BD5"/>
       </a:accent5>
       <a:accent6>
-        <a:srgbClr val="70ad47"/>
+        <a:srgbClr val="70AD47"/>
       </a:accent6>
       <a:hlink>
-        <a:srgbClr val="0563c1"/>
+        <a:srgbClr val="0563C1"/>
       </a:hlink>
       <a:folHlink>
-        <a:srgbClr val="954f72"/>
+        <a:srgbClr val="954F72"/>
       </a:folHlink>
     </a:clrScheme>
     <a:fontScheme name="Office">
@@ -3809,5 +4924,7 @@
       </a:bgFillStyleLst>
     </a:fmtScheme>
   </a:themeElements>
+  <a:objectDefaults/>
+  <a:extraClrSchemeLst/>
 </a:theme>
 </file>
</xml_diff>